<commit_message>
Added decorator slides. Minor fix in CVA-matrix slides.
</commit_message>
<xml_diff>
--- a/slides/702 - CVA - Matrix.pptx
+++ b/slides/702 - CVA - Matrix.pptx
@@ -28923,8 +28923,8 @@
         </p:blipFill>
         <p:spPr>
           <a:xfrm>
-            <a:off x="3611" y="10"/>
-            <a:ext cx="12188389" cy="6857990"/>
+            <a:off x="0" y="-1011"/>
+            <a:ext cx="12192000" cy="6860022"/>
           </a:xfrm>
           <a:prstGeom prst="rect">
             <a:avLst/>
@@ -31311,12 +31311,8 @@
           </a:p>
           <a:p>
             <a:r>
-              <a:rPr lang="en-US" b="1" dirty="0" err="1"/>
-              <a:t>Analyis</a:t>
-            </a:r>
-            <a:r>
               <a:rPr lang="en-US" b="1" dirty="0"/>
-              <a:t>: </a:t>
+              <a:t>Analysis: </a:t>
             </a:r>
             <a:r>
               <a:rPr lang="en-US" dirty="0"/>

</xml_diff>

<commit_message>
Minor changes to slides. Added guest lecture slide. Clarified CVA in final project description.
</commit_message>
<xml_diff>
--- a/slides/702 - CVA - Matrix.pptx
+++ b/slides/702 - CVA - Matrix.pptx
@@ -209,7 +209,7 @@
           <a:noFill/>
           <a:extLst>
             <a:ext uri="{909E8E84-426E-40dd-AFC4-6F175D3DCCD1}">
-              <a14:hiddenFill xmlns="" xmlns:a14="http://schemas.microsoft.com/office/drawing/2010/main">
+              <a14:hiddenFill xmlns:a14="http://schemas.microsoft.com/office/drawing/2010/main" xmlns="">
                 <a:solidFill>
                   <a:srgbClr val="FFFFFF"/>
                 </a:solidFill>
@@ -268,7 +268,7 @@
             </a:ln>
             <a:extLst>
               <a:ext uri="{91240B29-F687-4f45-9708-019B960494DF}">
-                <a14:hiddenLine xmlns="" xmlns:a14="http://schemas.microsoft.com/office/drawing/2010/main" w="9525">
+                <a14:hiddenLine xmlns:a14="http://schemas.microsoft.com/office/drawing/2010/main" xmlns="" w="9525">
                   <a:solidFill>
                     <a:srgbClr val="000000"/>
                   </a:solidFill>
@@ -358,7 +358,7 @@
             </a:ln>
             <a:extLst>
               <a:ext uri="{91240B29-F687-4f45-9708-019B960494DF}">
-                <a14:hiddenLine xmlns="" xmlns:a14="http://schemas.microsoft.com/office/drawing/2010/main" w="9525">
+                <a14:hiddenLine xmlns:a14="http://schemas.microsoft.com/office/drawing/2010/main" xmlns="" w="9525">
                   <a:solidFill>
                     <a:srgbClr val="000000"/>
                   </a:solidFill>
@@ -448,7 +448,7 @@
             </a:ln>
             <a:extLst>
               <a:ext uri="{91240B29-F687-4f45-9708-019B960494DF}">
-                <a14:hiddenLine xmlns="" xmlns:a14="http://schemas.microsoft.com/office/drawing/2010/main" w="9525">
+                <a14:hiddenLine xmlns:a14="http://schemas.microsoft.com/office/drawing/2010/main" xmlns="" w="9525">
                   <a:solidFill>
                     <a:srgbClr val="000000"/>
                   </a:solidFill>
@@ -482,7 +482,7 @@
             </a:ln>
             <a:extLst>
               <a:ext uri="{91240B29-F687-4f45-9708-019B960494DF}">
-                <a14:hiddenLine xmlns="" xmlns:a14="http://schemas.microsoft.com/office/drawing/2010/main" w="9525">
+                <a14:hiddenLine xmlns:a14="http://schemas.microsoft.com/office/drawing/2010/main" xmlns="" w="9525">
                   <a:solidFill>
                     <a:srgbClr val="000000"/>
                   </a:solidFill>
@@ -572,7 +572,7 @@
             </a:ln>
             <a:extLst>
               <a:ext uri="{91240B29-F687-4f45-9708-019B960494DF}">
-                <a14:hiddenLine xmlns="" xmlns:a14="http://schemas.microsoft.com/office/drawing/2010/main" w="9525">
+                <a14:hiddenLine xmlns:a14="http://schemas.microsoft.com/office/drawing/2010/main" xmlns="" w="9525">
                   <a:solidFill>
                     <a:srgbClr val="000000"/>
                   </a:solidFill>
@@ -634,7 +634,7 @@
             </a:ln>
             <a:extLst>
               <a:ext uri="{91240B29-F687-4f45-9708-019B960494DF}">
-                <a14:hiddenLine xmlns="" xmlns:a14="http://schemas.microsoft.com/office/drawing/2010/main" w="9525">
+                <a14:hiddenLine xmlns:a14="http://schemas.microsoft.com/office/drawing/2010/main" xmlns="" w="9525">
                   <a:solidFill>
                     <a:srgbClr val="000000"/>
                   </a:solidFill>
@@ -696,7 +696,7 @@
             </a:ln>
             <a:extLst>
               <a:ext uri="{91240B29-F687-4f45-9708-019B960494DF}">
-                <a14:hiddenLine xmlns="" xmlns:a14="http://schemas.microsoft.com/office/drawing/2010/main" w="9525">
+                <a14:hiddenLine xmlns:a14="http://schemas.microsoft.com/office/drawing/2010/main" xmlns="" w="9525">
                   <a:solidFill>
                     <a:srgbClr val="000000"/>
                   </a:solidFill>
@@ -786,7 +786,7 @@
             </a:ln>
             <a:extLst>
               <a:ext uri="{91240B29-F687-4f45-9708-019B960494DF}">
-                <a14:hiddenLine xmlns="" xmlns:a14="http://schemas.microsoft.com/office/drawing/2010/main" w="9525">
+                <a14:hiddenLine xmlns:a14="http://schemas.microsoft.com/office/drawing/2010/main" xmlns="" w="9525">
                   <a:solidFill>
                     <a:srgbClr val="000000"/>
                   </a:solidFill>
@@ -848,7 +848,7 @@
             </a:ln>
             <a:extLst>
               <a:ext uri="{91240B29-F687-4f45-9708-019B960494DF}">
-                <a14:hiddenLine xmlns="" xmlns:a14="http://schemas.microsoft.com/office/drawing/2010/main" w="9525">
+                <a14:hiddenLine xmlns:a14="http://schemas.microsoft.com/office/drawing/2010/main" xmlns="" w="9525">
                   <a:solidFill>
                     <a:srgbClr val="000000"/>
                   </a:solidFill>
@@ -910,7 +910,7 @@
             </a:ln>
             <a:extLst>
               <a:ext uri="{91240B29-F687-4f45-9708-019B960494DF}">
-                <a14:hiddenLine xmlns="" xmlns:a14="http://schemas.microsoft.com/office/drawing/2010/main" w="9525">
+                <a14:hiddenLine xmlns:a14="http://schemas.microsoft.com/office/drawing/2010/main" xmlns="" w="9525">
                   <a:solidFill>
                     <a:srgbClr val="000000"/>
                   </a:solidFill>
@@ -1000,7 +1000,7 @@
             </a:ln>
             <a:extLst>
               <a:ext uri="{91240B29-F687-4f45-9708-019B960494DF}">
-                <a14:hiddenLine xmlns="" xmlns:a14="http://schemas.microsoft.com/office/drawing/2010/main" w="9525">
+                <a14:hiddenLine xmlns:a14="http://schemas.microsoft.com/office/drawing/2010/main" xmlns="" w="9525">
                   <a:solidFill>
                     <a:srgbClr val="000000"/>
                   </a:solidFill>
@@ -1090,7 +1090,7 @@
             </a:ln>
             <a:extLst>
               <a:ext uri="{91240B29-F687-4f45-9708-019B960494DF}">
-                <a14:hiddenLine xmlns="" xmlns:a14="http://schemas.microsoft.com/office/drawing/2010/main" w="9525">
+                <a14:hiddenLine xmlns:a14="http://schemas.microsoft.com/office/drawing/2010/main" xmlns="" w="9525">
                   <a:solidFill>
                     <a:srgbClr val="000000"/>
                   </a:solidFill>
@@ -1152,7 +1152,7 @@
             </a:ln>
             <a:extLst>
               <a:ext uri="{91240B29-F687-4f45-9708-019B960494DF}">
-                <a14:hiddenLine xmlns="" xmlns:a14="http://schemas.microsoft.com/office/drawing/2010/main" w="9525">
+                <a14:hiddenLine xmlns:a14="http://schemas.microsoft.com/office/drawing/2010/main" xmlns="" w="9525">
                   <a:solidFill>
                     <a:srgbClr val="000000"/>
                   </a:solidFill>
@@ -1262,7 +1262,7 @@
             </a:ln>
             <a:extLst>
               <a:ext uri="{91240B29-F687-4f45-9708-019B960494DF}">
-                <a14:hiddenLine xmlns="" xmlns:a14="http://schemas.microsoft.com/office/drawing/2010/main" w="9525">
+                <a14:hiddenLine xmlns:a14="http://schemas.microsoft.com/office/drawing/2010/main" xmlns="" w="9525">
                   <a:solidFill>
                     <a:srgbClr val="000000"/>
                   </a:solidFill>
@@ -1324,7 +1324,7 @@
             </a:ln>
             <a:extLst>
               <a:ext uri="{91240B29-F687-4f45-9708-019B960494DF}">
-                <a14:hiddenLine xmlns="" xmlns:a14="http://schemas.microsoft.com/office/drawing/2010/main" w="9525">
+                <a14:hiddenLine xmlns:a14="http://schemas.microsoft.com/office/drawing/2010/main" xmlns="" w="9525">
                   <a:solidFill>
                     <a:srgbClr val="000000"/>
                   </a:solidFill>
@@ -1414,7 +1414,7 @@
             </a:ln>
             <a:extLst>
               <a:ext uri="{91240B29-F687-4f45-9708-019B960494DF}">
-                <a14:hiddenLine xmlns="" xmlns:a14="http://schemas.microsoft.com/office/drawing/2010/main" w="9525">
+                <a14:hiddenLine xmlns:a14="http://schemas.microsoft.com/office/drawing/2010/main" xmlns="" w="9525">
                   <a:solidFill>
                     <a:srgbClr val="000000"/>
                   </a:solidFill>
@@ -1504,7 +1504,7 @@
             </a:ln>
             <a:extLst>
               <a:ext uri="{91240B29-F687-4f45-9708-019B960494DF}">
-                <a14:hiddenLine xmlns="" xmlns:a14="http://schemas.microsoft.com/office/drawing/2010/main" w="9525">
+                <a14:hiddenLine xmlns:a14="http://schemas.microsoft.com/office/drawing/2010/main" xmlns="" w="9525">
                   <a:solidFill>
                     <a:srgbClr val="000000"/>
                   </a:solidFill>
@@ -1566,7 +1566,7 @@
             </a:ln>
             <a:extLst>
               <a:ext uri="{91240B29-F687-4f45-9708-019B960494DF}">
-                <a14:hiddenLine xmlns="" xmlns:a14="http://schemas.microsoft.com/office/drawing/2010/main" w="9525">
+                <a14:hiddenLine xmlns:a14="http://schemas.microsoft.com/office/drawing/2010/main" xmlns="" w="9525">
                   <a:solidFill>
                     <a:srgbClr val="000000"/>
                   </a:solidFill>
@@ -1656,7 +1656,7 @@
             </a:ln>
             <a:extLst>
               <a:ext uri="{91240B29-F687-4f45-9708-019B960494DF}">
-                <a14:hiddenLine xmlns="" xmlns:a14="http://schemas.microsoft.com/office/drawing/2010/main" w="9525">
+                <a14:hiddenLine xmlns:a14="http://schemas.microsoft.com/office/drawing/2010/main" xmlns="" w="9525">
                   <a:solidFill>
                     <a:srgbClr val="000000"/>
                   </a:solidFill>
@@ -1746,7 +1746,7 @@
             </a:ln>
             <a:extLst>
               <a:ext uri="{91240B29-F687-4f45-9708-019B960494DF}">
-                <a14:hiddenLine xmlns="" xmlns:a14="http://schemas.microsoft.com/office/drawing/2010/main" w="9525">
+                <a14:hiddenLine xmlns:a14="http://schemas.microsoft.com/office/drawing/2010/main" xmlns="" w="9525">
                   <a:solidFill>
                     <a:srgbClr val="000000"/>
                   </a:solidFill>
@@ -1802,7 +1802,7 @@
             </a:ln>
             <a:extLst>
               <a:ext uri="{91240B29-F687-4f45-9708-019B960494DF}">
-                <a14:hiddenLine xmlns="" xmlns:a14="http://schemas.microsoft.com/office/drawing/2010/main" w="9525">
+                <a14:hiddenLine xmlns:a14="http://schemas.microsoft.com/office/drawing/2010/main" xmlns="" w="9525">
                   <a:solidFill>
                     <a:srgbClr val="000000"/>
                   </a:solidFill>
@@ -1892,7 +1892,7 @@
             </a:ln>
             <a:extLst>
               <a:ext uri="{91240B29-F687-4f45-9708-019B960494DF}">
-                <a14:hiddenLine xmlns="" xmlns:a14="http://schemas.microsoft.com/office/drawing/2010/main" w="9525">
+                <a14:hiddenLine xmlns:a14="http://schemas.microsoft.com/office/drawing/2010/main" xmlns="" w="9525">
                   <a:solidFill>
                     <a:srgbClr val="000000"/>
                   </a:solidFill>
@@ -1948,7 +1948,7 @@
             </a:ln>
             <a:extLst>
               <a:ext uri="{91240B29-F687-4f45-9708-019B960494DF}">
-                <a14:hiddenLine xmlns="" xmlns:a14="http://schemas.microsoft.com/office/drawing/2010/main" w="9525">
+                <a14:hiddenLine xmlns:a14="http://schemas.microsoft.com/office/drawing/2010/main" xmlns="" w="9525">
                   <a:solidFill>
                     <a:srgbClr val="000000"/>
                   </a:solidFill>
@@ -2038,7 +2038,7 @@
             </a:ln>
             <a:extLst>
               <a:ext uri="{91240B29-F687-4f45-9708-019B960494DF}">
-                <a14:hiddenLine xmlns="" xmlns:a14="http://schemas.microsoft.com/office/drawing/2010/main" w="9525">
+                <a14:hiddenLine xmlns:a14="http://schemas.microsoft.com/office/drawing/2010/main" xmlns="" w="9525">
                   <a:solidFill>
                     <a:srgbClr val="000000"/>
                   </a:solidFill>
@@ -2106,7 +2106,7 @@
             </a:ln>
             <a:extLst>
               <a:ext uri="{91240B29-F687-4f45-9708-019B960494DF}">
-                <a14:hiddenLine xmlns="" xmlns:a14="http://schemas.microsoft.com/office/drawing/2010/main" w="9525">
+                <a14:hiddenLine xmlns:a14="http://schemas.microsoft.com/office/drawing/2010/main" xmlns="" w="9525">
                   <a:solidFill>
                     <a:srgbClr val="000000"/>
                   </a:solidFill>
@@ -2196,7 +2196,7 @@
             </a:ln>
             <a:extLst>
               <a:ext uri="{91240B29-F687-4f45-9708-019B960494DF}">
-                <a14:hiddenLine xmlns="" xmlns:a14="http://schemas.microsoft.com/office/drawing/2010/main" w="9525">
+                <a14:hiddenLine xmlns:a14="http://schemas.microsoft.com/office/drawing/2010/main" xmlns="" w="9525">
                   <a:solidFill>
                     <a:srgbClr val="000000"/>
                   </a:solidFill>
@@ -2264,7 +2264,7 @@
             </a:ln>
             <a:extLst>
               <a:ext uri="{91240B29-F687-4f45-9708-019B960494DF}">
-                <a14:hiddenLine xmlns="" xmlns:a14="http://schemas.microsoft.com/office/drawing/2010/main" w="9525">
+                <a14:hiddenLine xmlns:a14="http://schemas.microsoft.com/office/drawing/2010/main" xmlns="" w="9525">
                   <a:solidFill>
                     <a:srgbClr val="000000"/>
                   </a:solidFill>
@@ -2354,7 +2354,7 @@
             </a:ln>
             <a:extLst>
               <a:ext uri="{91240B29-F687-4f45-9708-019B960494DF}">
-                <a14:hiddenLine xmlns="" xmlns:a14="http://schemas.microsoft.com/office/drawing/2010/main" w="9525">
+                <a14:hiddenLine xmlns:a14="http://schemas.microsoft.com/office/drawing/2010/main" xmlns="" w="9525">
                   <a:solidFill>
                     <a:srgbClr val="000000"/>
                   </a:solidFill>
@@ -2388,7 +2388,7 @@
             </a:ln>
             <a:extLst>
               <a:ext uri="{91240B29-F687-4f45-9708-019B960494DF}">
-                <a14:hiddenLine xmlns="" xmlns:a14="http://schemas.microsoft.com/office/drawing/2010/main" w="9525">
+                <a14:hiddenLine xmlns:a14="http://schemas.microsoft.com/office/drawing/2010/main" xmlns="" w="9525">
                   <a:solidFill>
                     <a:srgbClr val="000000"/>
                   </a:solidFill>
@@ -2478,7 +2478,7 @@
             </a:ln>
             <a:extLst>
               <a:ext uri="{91240B29-F687-4f45-9708-019B960494DF}">
-                <a14:hiddenLine xmlns="" xmlns:a14="http://schemas.microsoft.com/office/drawing/2010/main" w="9525">
+                <a14:hiddenLine xmlns:a14="http://schemas.microsoft.com/office/drawing/2010/main" xmlns="" w="9525">
                   <a:solidFill>
                     <a:srgbClr val="000000"/>
                   </a:solidFill>
@@ -2540,7 +2540,7 @@
             </a:ln>
             <a:extLst>
               <a:ext uri="{91240B29-F687-4f45-9708-019B960494DF}">
-                <a14:hiddenLine xmlns="" xmlns:a14="http://schemas.microsoft.com/office/drawing/2010/main" w="9525">
+                <a14:hiddenLine xmlns:a14="http://schemas.microsoft.com/office/drawing/2010/main" xmlns="" w="9525">
                   <a:solidFill>
                     <a:srgbClr val="000000"/>
                   </a:solidFill>
@@ -2602,7 +2602,7 @@
             </a:ln>
             <a:extLst>
               <a:ext uri="{91240B29-F687-4f45-9708-019B960494DF}">
-                <a14:hiddenLine xmlns="" xmlns:a14="http://schemas.microsoft.com/office/drawing/2010/main" w="9525">
+                <a14:hiddenLine xmlns:a14="http://schemas.microsoft.com/office/drawing/2010/main" xmlns="" w="9525">
                   <a:solidFill>
                     <a:srgbClr val="000000"/>
                   </a:solidFill>
@@ -2692,7 +2692,7 @@
             </a:ln>
             <a:extLst>
               <a:ext uri="{91240B29-F687-4f45-9708-019B960494DF}">
-                <a14:hiddenLine xmlns="" xmlns:a14="http://schemas.microsoft.com/office/drawing/2010/main" w="9525">
+                <a14:hiddenLine xmlns:a14="http://schemas.microsoft.com/office/drawing/2010/main" xmlns="" w="9525">
                   <a:solidFill>
                     <a:srgbClr val="000000"/>
                   </a:solidFill>
@@ -2760,7 +2760,7 @@
             </a:ln>
             <a:extLst>
               <a:ext uri="{91240B29-F687-4f45-9708-019B960494DF}">
-                <a14:hiddenLine xmlns="" xmlns:a14="http://schemas.microsoft.com/office/drawing/2010/main" w="9525">
+                <a14:hiddenLine xmlns:a14="http://schemas.microsoft.com/office/drawing/2010/main" xmlns="" w="9525">
                   <a:solidFill>
                     <a:srgbClr val="000000"/>
                   </a:solidFill>
@@ -2822,7 +2822,7 @@
             </a:ln>
             <a:extLst>
               <a:ext uri="{91240B29-F687-4f45-9708-019B960494DF}">
-                <a14:hiddenLine xmlns="" xmlns:a14="http://schemas.microsoft.com/office/drawing/2010/main" w="9525">
+                <a14:hiddenLine xmlns:a14="http://schemas.microsoft.com/office/drawing/2010/main" xmlns="" w="9525">
                   <a:solidFill>
                     <a:srgbClr val="000000"/>
                   </a:solidFill>
@@ -2912,7 +2912,7 @@
             </a:ln>
             <a:extLst>
               <a:ext uri="{91240B29-F687-4f45-9708-019B960494DF}">
-                <a14:hiddenLine xmlns="" xmlns:a14="http://schemas.microsoft.com/office/drawing/2010/main" w="9525">
+                <a14:hiddenLine xmlns:a14="http://schemas.microsoft.com/office/drawing/2010/main" xmlns="" w="9525">
                   <a:solidFill>
                     <a:srgbClr val="000000"/>
                   </a:solidFill>
@@ -2974,7 +2974,7 @@
             </a:ln>
             <a:extLst>
               <a:ext uri="{91240B29-F687-4f45-9708-019B960494DF}">
-                <a14:hiddenLine xmlns="" xmlns:a14="http://schemas.microsoft.com/office/drawing/2010/main" w="9525">
+                <a14:hiddenLine xmlns:a14="http://schemas.microsoft.com/office/drawing/2010/main" xmlns="" w="9525">
                   <a:solidFill>
                     <a:srgbClr val="000000"/>
                   </a:solidFill>
@@ -3064,7 +3064,7 @@
             </a:ln>
             <a:extLst>
               <a:ext uri="{91240B29-F687-4f45-9708-019B960494DF}">
-                <a14:hiddenLine xmlns="" xmlns:a14="http://schemas.microsoft.com/office/drawing/2010/main" w="9525">
+                <a14:hiddenLine xmlns:a14="http://schemas.microsoft.com/office/drawing/2010/main" xmlns="" w="9525">
                   <a:solidFill>
                     <a:srgbClr val="000000"/>
                   </a:solidFill>
@@ -3126,7 +3126,7 @@
             </a:ln>
             <a:extLst>
               <a:ext uri="{91240B29-F687-4f45-9708-019B960494DF}">
-                <a14:hiddenLine xmlns="" xmlns:a14="http://schemas.microsoft.com/office/drawing/2010/main" w="9525">
+                <a14:hiddenLine xmlns:a14="http://schemas.microsoft.com/office/drawing/2010/main" xmlns="" w="9525">
                   <a:solidFill>
                     <a:srgbClr val="000000"/>
                   </a:solidFill>
@@ -3216,7 +3216,7 @@
             </a:ln>
             <a:extLst>
               <a:ext uri="{91240B29-F687-4f45-9708-019B960494DF}">
-                <a14:hiddenLine xmlns="" xmlns:a14="http://schemas.microsoft.com/office/drawing/2010/main" w="9525">
+                <a14:hiddenLine xmlns:a14="http://schemas.microsoft.com/office/drawing/2010/main" xmlns="" w="9525">
                   <a:solidFill>
                     <a:srgbClr val="000000"/>
                   </a:solidFill>
@@ -3250,7 +3250,7 @@
             </a:ln>
             <a:extLst>
               <a:ext uri="{91240B29-F687-4f45-9708-019B960494DF}">
-                <a14:hiddenLine xmlns="" xmlns:a14="http://schemas.microsoft.com/office/drawing/2010/main" w="9525">
+                <a14:hiddenLine xmlns:a14="http://schemas.microsoft.com/office/drawing/2010/main" xmlns="" w="9525">
                   <a:solidFill>
                     <a:srgbClr val="000000"/>
                   </a:solidFill>
@@ -3315,7 +3315,7 @@
             </a:ln>
             <a:extLst>
               <a:ext uri="{91240B29-F687-4f45-9708-019B960494DF}">
-                <a14:hiddenLine xmlns="" xmlns:a14="http://schemas.microsoft.com/office/drawing/2010/main" w="9525">
+                <a14:hiddenLine xmlns:a14="http://schemas.microsoft.com/office/drawing/2010/main" xmlns="" w="9525">
                   <a:solidFill>
                     <a:srgbClr val="000000"/>
                   </a:solidFill>
@@ -3405,7 +3405,7 @@
             </a:ln>
             <a:extLst>
               <a:ext uri="{91240B29-F687-4f45-9708-019B960494DF}">
-                <a14:hiddenLine xmlns="" xmlns:a14="http://schemas.microsoft.com/office/drawing/2010/main" w="9525">
+                <a14:hiddenLine xmlns:a14="http://schemas.microsoft.com/office/drawing/2010/main" xmlns="" w="9525">
                   <a:solidFill>
                     <a:srgbClr val="000000"/>
                   </a:solidFill>
@@ -3467,7 +3467,7 @@
             </a:ln>
             <a:extLst>
               <a:ext uri="{91240B29-F687-4f45-9708-019B960494DF}">
-                <a14:hiddenLine xmlns="" xmlns:a14="http://schemas.microsoft.com/office/drawing/2010/main" w="9525">
+                <a14:hiddenLine xmlns:a14="http://schemas.microsoft.com/office/drawing/2010/main" xmlns="" w="9525">
                   <a:solidFill>
                     <a:srgbClr val="000000"/>
                   </a:solidFill>
@@ -3557,7 +3557,7 @@
             </a:ln>
             <a:extLst>
               <a:ext uri="{91240B29-F687-4f45-9708-019B960494DF}">
-                <a14:hiddenLine xmlns="" xmlns:a14="http://schemas.microsoft.com/office/drawing/2010/main" w="9525">
+                <a14:hiddenLine xmlns:a14="http://schemas.microsoft.com/office/drawing/2010/main" xmlns="" w="9525">
                   <a:solidFill>
                     <a:srgbClr val="000000"/>
                   </a:solidFill>
@@ -3647,7 +3647,7 @@
             </a:ln>
             <a:extLst>
               <a:ext uri="{91240B29-F687-4f45-9708-019B960494DF}">
-                <a14:hiddenLine xmlns="" xmlns:a14="http://schemas.microsoft.com/office/drawing/2010/main" w="9525">
+                <a14:hiddenLine xmlns:a14="http://schemas.microsoft.com/office/drawing/2010/main" xmlns="" w="9525">
                   <a:solidFill>
                     <a:srgbClr val="000000"/>
                   </a:solidFill>
@@ -3712,7 +3712,7 @@
             </a:ln>
             <a:extLst>
               <a:ext uri="{91240B29-F687-4f45-9708-019B960494DF}">
-                <a14:hiddenLine xmlns="" xmlns:a14="http://schemas.microsoft.com/office/drawing/2010/main" w="9525">
+                <a14:hiddenLine xmlns:a14="http://schemas.microsoft.com/office/drawing/2010/main" xmlns="" w="9525">
                   <a:solidFill>
                     <a:srgbClr val="000000"/>
                   </a:solidFill>
@@ -3774,7 +3774,7 @@
             </a:ln>
             <a:extLst>
               <a:ext uri="{91240B29-F687-4f45-9708-019B960494DF}">
-                <a14:hiddenLine xmlns="" xmlns:a14="http://schemas.microsoft.com/office/drawing/2010/main" w="9525">
+                <a14:hiddenLine xmlns:a14="http://schemas.microsoft.com/office/drawing/2010/main" xmlns="" w="9525">
                   <a:solidFill>
                     <a:srgbClr val="000000"/>
                   </a:solidFill>
@@ -3864,7 +3864,7 @@
             </a:ln>
             <a:extLst>
               <a:ext uri="{91240B29-F687-4f45-9708-019B960494DF}">
-                <a14:hiddenLine xmlns="" xmlns:a14="http://schemas.microsoft.com/office/drawing/2010/main" w="9525">
+                <a14:hiddenLine xmlns:a14="http://schemas.microsoft.com/office/drawing/2010/main" xmlns="" w="9525">
                   <a:solidFill>
                     <a:srgbClr val="000000"/>
                   </a:solidFill>
@@ -3954,7 +3954,7 @@
             </a:ln>
             <a:extLst>
               <a:ext uri="{91240B29-F687-4f45-9708-019B960494DF}">
-                <a14:hiddenLine xmlns="" xmlns:a14="http://schemas.microsoft.com/office/drawing/2010/main" w="9525">
+                <a14:hiddenLine xmlns:a14="http://schemas.microsoft.com/office/drawing/2010/main" xmlns="" w="9525">
                   <a:solidFill>
                     <a:srgbClr val="000000"/>
                   </a:solidFill>
@@ -4016,7 +4016,7 @@
             </a:ln>
             <a:extLst>
               <a:ext uri="{91240B29-F687-4f45-9708-019B960494DF}">
-                <a14:hiddenLine xmlns="" xmlns:a14="http://schemas.microsoft.com/office/drawing/2010/main" w="9525">
+                <a14:hiddenLine xmlns:a14="http://schemas.microsoft.com/office/drawing/2010/main" xmlns="" w="9525">
                   <a:solidFill>
                     <a:srgbClr val="000000"/>
                   </a:solidFill>
@@ -4136,7 +4136,7 @@
             </a:ln>
             <a:extLst>
               <a:ext uri="{91240B29-F687-4f45-9708-019B960494DF}">
-                <a14:hiddenLine xmlns="" xmlns:a14="http://schemas.microsoft.com/office/drawing/2010/main" w="9525">
+                <a14:hiddenLine xmlns:a14="http://schemas.microsoft.com/office/drawing/2010/main" xmlns="" w="9525">
                   <a:solidFill>
                     <a:srgbClr val="000000"/>
                   </a:solidFill>
@@ -4204,7 +4204,7 @@
             </a:ln>
             <a:extLst>
               <a:ext uri="{91240B29-F687-4f45-9708-019B960494DF}">
-                <a14:hiddenLine xmlns="" xmlns:a14="http://schemas.microsoft.com/office/drawing/2010/main" w="9525">
+                <a14:hiddenLine xmlns:a14="http://schemas.microsoft.com/office/drawing/2010/main" xmlns="" w="9525">
                   <a:solidFill>
                     <a:srgbClr val="000000"/>
                   </a:solidFill>
@@ -4294,7 +4294,7 @@
             </a:ln>
             <a:extLst>
               <a:ext uri="{91240B29-F687-4f45-9708-019B960494DF}">
-                <a14:hiddenLine xmlns="" xmlns:a14="http://schemas.microsoft.com/office/drawing/2010/main" w="9525">
+                <a14:hiddenLine xmlns:a14="http://schemas.microsoft.com/office/drawing/2010/main" xmlns="" w="9525">
                   <a:solidFill>
                     <a:srgbClr val="000000"/>
                   </a:solidFill>
@@ -4435,7 +4435,7 @@
             <a:fld id="{B61BEF0D-F0BB-DE4B-95CE-6DB70DBA9567}" type="datetimeFigureOut">
               <a:rPr lang="en-US" smtClean="0"/>
               <a:pPr/>
-              <a:t>10/17/19</a:t>
+              <a:t>10/21/19</a:t>
             </a:fld>
             <a:endParaRPr lang="en-US" dirty="0"/>
           </a:p>
@@ -4704,7 +4704,7 @@
             <a:fld id="{B61BEF0D-F0BB-DE4B-95CE-6DB70DBA9567}" type="datetimeFigureOut">
               <a:rPr lang="en-US" smtClean="0"/>
               <a:pPr/>
-              <a:t>10/17/19</a:t>
+              <a:t>10/21/19</a:t>
             </a:fld>
             <a:endParaRPr lang="en-US" dirty="0"/>
           </a:p>
@@ -4902,7 +4902,7 @@
             <a:fld id="{B61BEF0D-F0BB-DE4B-95CE-6DB70DBA9567}" type="datetimeFigureOut">
               <a:rPr lang="en-US" smtClean="0"/>
               <a:pPr/>
-              <a:t>10/17/19</a:t>
+              <a:t>10/21/19</a:t>
             </a:fld>
             <a:endParaRPr lang="en-US" dirty="0"/>
           </a:p>
@@ -5167,7 +5167,7 @@
             <a:fld id="{B61BEF0D-F0BB-DE4B-95CE-6DB70DBA9567}" type="datetimeFigureOut">
               <a:rPr lang="en-US" smtClean="0"/>
               <a:pPr/>
-              <a:t>10/17/19</a:t>
+              <a:t>10/21/19</a:t>
             </a:fld>
             <a:endParaRPr lang="en-US" dirty="0"/>
           </a:p>
@@ -5603,7 +5603,7 @@
             <a:fld id="{B61BEF0D-F0BB-DE4B-95CE-6DB70DBA9567}" type="datetimeFigureOut">
               <a:rPr lang="en-US" smtClean="0"/>
               <a:pPr/>
-              <a:t>10/17/19</a:t>
+              <a:t>10/21/19</a:t>
             </a:fld>
             <a:endParaRPr lang="en-US" dirty="0"/>
           </a:p>
@@ -6151,7 +6151,7 @@
             <a:fld id="{B61BEF0D-F0BB-DE4B-95CE-6DB70DBA9567}" type="datetimeFigureOut">
               <a:rPr lang="en-US" smtClean="0"/>
               <a:pPr/>
-              <a:t>10/17/19</a:t>
+              <a:t>10/21/19</a:t>
             </a:fld>
             <a:endParaRPr lang="en-US" dirty="0"/>
           </a:p>
@@ -6873,7 +6873,7 @@
             <a:fld id="{B61BEF0D-F0BB-DE4B-95CE-6DB70DBA9567}" type="datetimeFigureOut">
               <a:rPr lang="en-US" smtClean="0"/>
               <a:pPr/>
-              <a:t>10/17/19</a:t>
+              <a:t>10/21/19</a:t>
             </a:fld>
             <a:endParaRPr lang="en-US" dirty="0"/>
           </a:p>
@@ -7045,7 +7045,7 @@
             <a:fld id="{B61BEF0D-F0BB-DE4B-95CE-6DB70DBA9567}" type="datetimeFigureOut">
               <a:rPr lang="en-US" smtClean="0"/>
               <a:pPr/>
-              <a:t>10/17/19</a:t>
+              <a:t>10/21/19</a:t>
             </a:fld>
             <a:endParaRPr lang="en-US" dirty="0"/>
           </a:p>
@@ -7227,7 +7227,7 @@
             <a:fld id="{B61BEF0D-F0BB-DE4B-95CE-6DB70DBA9567}" type="datetimeFigureOut">
               <a:rPr lang="en-US" smtClean="0"/>
               <a:pPr/>
-              <a:t>10/17/19</a:t>
+              <a:t>10/21/19</a:t>
             </a:fld>
             <a:endParaRPr lang="en-US" dirty="0"/>
           </a:p>
@@ -7416,7 +7416,7 @@
             <a:fld id="{B61BEF0D-F0BB-DE4B-95CE-6DB70DBA9567}" type="datetimeFigureOut">
               <a:rPr lang="en-US" smtClean="0"/>
               <a:pPr/>
-              <a:t>10/17/19</a:t>
+              <a:t>10/21/19</a:t>
             </a:fld>
             <a:endParaRPr lang="en-US" dirty="0"/>
           </a:p>
@@ -7668,7 +7668,7 @@
             <a:fld id="{B61BEF0D-F0BB-DE4B-95CE-6DB70DBA9567}" type="datetimeFigureOut">
               <a:rPr lang="en-US" smtClean="0"/>
               <a:pPr/>
-              <a:t>10/17/19</a:t>
+              <a:t>10/21/19</a:t>
             </a:fld>
             <a:endParaRPr lang="en-US" dirty="0"/>
           </a:p>
@@ -7902,7 +7902,7 @@
             <a:fld id="{B61BEF0D-F0BB-DE4B-95CE-6DB70DBA9567}" type="datetimeFigureOut">
               <a:rPr lang="en-US" smtClean="0"/>
               <a:pPr/>
-              <a:t>10/17/19</a:t>
+              <a:t>10/21/19</a:t>
             </a:fld>
             <a:endParaRPr lang="en-US" dirty="0"/>
           </a:p>
@@ -8289,7 +8289,7 @@
             <a:fld id="{B61BEF0D-F0BB-DE4B-95CE-6DB70DBA9567}" type="datetimeFigureOut">
               <a:rPr lang="en-US" smtClean="0"/>
               <a:pPr/>
-              <a:t>10/17/19</a:t>
+              <a:t>10/21/19</a:t>
             </a:fld>
             <a:endParaRPr lang="en-US" dirty="0"/>
           </a:p>
@@ -8409,7 +8409,7 @@
             <a:fld id="{B61BEF0D-F0BB-DE4B-95CE-6DB70DBA9567}" type="datetimeFigureOut">
               <a:rPr lang="en-US" smtClean="0"/>
               <a:pPr/>
-              <a:t>10/17/19</a:t>
+              <a:t>10/21/19</a:t>
             </a:fld>
             <a:endParaRPr lang="en-US" dirty="0"/>
           </a:p>
@@ -8506,7 +8506,7 @@
             <a:fld id="{B61BEF0D-F0BB-DE4B-95CE-6DB70DBA9567}" type="datetimeFigureOut">
               <a:rPr lang="en-US" smtClean="0"/>
               <a:pPr/>
-              <a:t>10/17/19</a:t>
+              <a:t>10/21/19</a:t>
             </a:fld>
             <a:endParaRPr lang="en-US" dirty="0"/>
           </a:p>
@@ -8757,7 +8757,7 @@
             <a:fld id="{B61BEF0D-F0BB-DE4B-95CE-6DB70DBA9567}" type="datetimeFigureOut">
               <a:rPr lang="en-US" smtClean="0"/>
               <a:pPr/>
-              <a:t>10/17/19</a:t>
+              <a:t>10/21/19</a:t>
             </a:fld>
             <a:endParaRPr lang="en-US" dirty="0"/>
           </a:p>
@@ -9044,7 +9044,7 @@
             <a:fld id="{B61BEF0D-F0BB-DE4B-95CE-6DB70DBA9567}" type="datetimeFigureOut">
               <a:rPr lang="en-US" smtClean="0"/>
               <a:pPr/>
-              <a:t>10/17/19</a:t>
+              <a:t>10/21/19</a:t>
             </a:fld>
             <a:endParaRPr lang="en-US" dirty="0"/>
           </a:p>
@@ -9168,7 +9168,7 @@
           <a:noFill/>
           <a:extLst>
             <a:ext uri="{909E8E84-426E-40dd-AFC4-6F175D3DCCD1}">
-              <a14:hiddenFill xmlns="" xmlns:a14="http://schemas.microsoft.com/office/drawing/2010/main">
+              <a14:hiddenFill xmlns:a14="http://schemas.microsoft.com/office/drawing/2010/main" xmlns="">
                 <a:solidFill>
                   <a:srgbClr val="FFFFFF"/>
                 </a:solidFill>
@@ -9242,7 +9242,7 @@
               </a:ln>
               <a:extLst>
                 <a:ext uri="{91240B29-F687-4f45-9708-019B960494DF}">
-                  <a14:hiddenLine xmlns="" xmlns:a14="http://schemas.microsoft.com/office/drawing/2010/main" w="9525">
+                  <a14:hiddenLine xmlns:a14="http://schemas.microsoft.com/office/drawing/2010/main" xmlns="" w="9525">
                     <a:solidFill>
                       <a:srgbClr val="000000"/>
                     </a:solidFill>
@@ -9332,7 +9332,7 @@
               </a:ln>
               <a:extLst>
                 <a:ext uri="{91240B29-F687-4f45-9708-019B960494DF}">
-                  <a14:hiddenLine xmlns="" xmlns:a14="http://schemas.microsoft.com/office/drawing/2010/main" w="9525">
+                  <a14:hiddenLine xmlns:a14="http://schemas.microsoft.com/office/drawing/2010/main" xmlns="" w="9525">
                     <a:solidFill>
                       <a:srgbClr val="000000"/>
                     </a:solidFill>
@@ -9422,7 +9422,7 @@
               </a:ln>
               <a:extLst>
                 <a:ext uri="{91240B29-F687-4f45-9708-019B960494DF}">
-                  <a14:hiddenLine xmlns="" xmlns:a14="http://schemas.microsoft.com/office/drawing/2010/main" w="9525">
+                  <a14:hiddenLine xmlns:a14="http://schemas.microsoft.com/office/drawing/2010/main" xmlns="" w="9525">
                     <a:solidFill>
                       <a:srgbClr val="000000"/>
                     </a:solidFill>
@@ -9484,7 +9484,7 @@
               </a:ln>
               <a:extLst>
                 <a:ext uri="{91240B29-F687-4f45-9708-019B960494DF}">
-                  <a14:hiddenLine xmlns="" xmlns:a14="http://schemas.microsoft.com/office/drawing/2010/main" w="9525">
+                  <a14:hiddenLine xmlns:a14="http://schemas.microsoft.com/office/drawing/2010/main" xmlns="" w="9525">
                     <a:solidFill>
                       <a:srgbClr val="000000"/>
                     </a:solidFill>
@@ -9574,7 +9574,7 @@
               </a:ln>
               <a:extLst>
                 <a:ext uri="{91240B29-F687-4f45-9708-019B960494DF}">
-                  <a14:hiddenLine xmlns="" xmlns:a14="http://schemas.microsoft.com/office/drawing/2010/main" w="9525">
+                  <a14:hiddenLine xmlns:a14="http://schemas.microsoft.com/office/drawing/2010/main" xmlns="" w="9525">
                     <a:solidFill>
                       <a:srgbClr val="000000"/>
                     </a:solidFill>
@@ -9636,7 +9636,7 @@
               </a:ln>
               <a:extLst>
                 <a:ext uri="{91240B29-F687-4f45-9708-019B960494DF}">
-                  <a14:hiddenLine xmlns="" xmlns:a14="http://schemas.microsoft.com/office/drawing/2010/main" w="9525">
+                  <a14:hiddenLine xmlns:a14="http://schemas.microsoft.com/office/drawing/2010/main" xmlns="" w="9525">
                     <a:solidFill>
                       <a:srgbClr val="000000"/>
                     </a:solidFill>
@@ -9698,7 +9698,7 @@
               </a:ln>
               <a:extLst>
                 <a:ext uri="{91240B29-F687-4f45-9708-019B960494DF}">
-                  <a14:hiddenLine xmlns="" xmlns:a14="http://schemas.microsoft.com/office/drawing/2010/main" w="9525">
+                  <a14:hiddenLine xmlns:a14="http://schemas.microsoft.com/office/drawing/2010/main" xmlns="" w="9525">
                     <a:solidFill>
                       <a:srgbClr val="000000"/>
                     </a:solidFill>
@@ -9788,7 +9788,7 @@
               </a:ln>
               <a:extLst>
                 <a:ext uri="{91240B29-F687-4f45-9708-019B960494DF}">
-                  <a14:hiddenLine xmlns="" xmlns:a14="http://schemas.microsoft.com/office/drawing/2010/main" w="9525">
+                  <a14:hiddenLine xmlns:a14="http://schemas.microsoft.com/office/drawing/2010/main" xmlns="" w="9525">
                     <a:solidFill>
                       <a:srgbClr val="000000"/>
                     </a:solidFill>
@@ -9878,7 +9878,7 @@
               </a:ln>
               <a:extLst>
                 <a:ext uri="{91240B29-F687-4f45-9708-019B960494DF}">
-                  <a14:hiddenLine xmlns="" xmlns:a14="http://schemas.microsoft.com/office/drawing/2010/main" w="9525">
+                  <a14:hiddenLine xmlns:a14="http://schemas.microsoft.com/office/drawing/2010/main" xmlns="" w="9525">
                     <a:solidFill>
                       <a:srgbClr val="000000"/>
                     </a:solidFill>
@@ -9940,7 +9940,7 @@
               </a:ln>
               <a:extLst>
                 <a:ext uri="{91240B29-F687-4f45-9708-019B960494DF}">
-                  <a14:hiddenLine xmlns="" xmlns:a14="http://schemas.microsoft.com/office/drawing/2010/main" w="9525">
+                  <a14:hiddenLine xmlns:a14="http://schemas.microsoft.com/office/drawing/2010/main" xmlns="" w="9525">
                     <a:solidFill>
                       <a:srgbClr val="000000"/>
                     </a:solidFill>
@@ -10050,7 +10050,7 @@
               </a:ln>
               <a:extLst>
                 <a:ext uri="{91240B29-F687-4f45-9708-019B960494DF}">
-                  <a14:hiddenLine xmlns="" xmlns:a14="http://schemas.microsoft.com/office/drawing/2010/main" w="9525">
+                  <a14:hiddenLine xmlns:a14="http://schemas.microsoft.com/office/drawing/2010/main" xmlns="" w="9525">
                     <a:solidFill>
                       <a:srgbClr val="000000"/>
                     </a:solidFill>
@@ -10134,7 +10134,7 @@
               </a:ln>
               <a:extLst>
                 <a:ext uri="{91240B29-F687-4f45-9708-019B960494DF}">
-                  <a14:hiddenLine xmlns="" xmlns:a14="http://schemas.microsoft.com/office/drawing/2010/main" w="9525">
+                  <a14:hiddenLine xmlns:a14="http://schemas.microsoft.com/office/drawing/2010/main" xmlns="" w="9525">
                     <a:solidFill>
                       <a:srgbClr val="000000"/>
                     </a:solidFill>
@@ -10196,7 +10196,7 @@
               </a:ln>
               <a:extLst>
                 <a:ext uri="{91240B29-F687-4f45-9708-019B960494DF}">
-                  <a14:hiddenLine xmlns="" xmlns:a14="http://schemas.microsoft.com/office/drawing/2010/main" w="9525">
+                  <a14:hiddenLine xmlns:a14="http://schemas.microsoft.com/office/drawing/2010/main" xmlns="" w="9525">
                     <a:solidFill>
                       <a:srgbClr val="000000"/>
                     </a:solidFill>
@@ -10258,7 +10258,7 @@
               </a:ln>
               <a:extLst>
                 <a:ext uri="{91240B29-F687-4f45-9708-019B960494DF}">
-                  <a14:hiddenLine xmlns="" xmlns:a14="http://schemas.microsoft.com/office/drawing/2010/main" w="9525">
+                  <a14:hiddenLine xmlns:a14="http://schemas.microsoft.com/office/drawing/2010/main" xmlns="" w="9525">
                     <a:solidFill>
                       <a:srgbClr val="000000"/>
                     </a:solidFill>
@@ -10348,7 +10348,7 @@
               </a:ln>
               <a:extLst>
                 <a:ext uri="{91240B29-F687-4f45-9708-019B960494DF}">
-                  <a14:hiddenLine xmlns="" xmlns:a14="http://schemas.microsoft.com/office/drawing/2010/main" w="9525">
+                  <a14:hiddenLine xmlns:a14="http://schemas.microsoft.com/office/drawing/2010/main" xmlns="" w="9525">
                     <a:solidFill>
                       <a:srgbClr val="000000"/>
                     </a:solidFill>
@@ -10382,7 +10382,7 @@
               </a:ln>
               <a:extLst>
                 <a:ext uri="{91240B29-F687-4f45-9708-019B960494DF}">
-                  <a14:hiddenLine xmlns="" xmlns:a14="http://schemas.microsoft.com/office/drawing/2010/main" w="9525">
+                  <a14:hiddenLine xmlns:a14="http://schemas.microsoft.com/office/drawing/2010/main" xmlns="" w="9525">
                     <a:solidFill>
                       <a:srgbClr val="000000"/>
                     </a:solidFill>
@@ -10447,7 +10447,7 @@
               </a:ln>
               <a:extLst>
                 <a:ext uri="{91240B29-F687-4f45-9708-019B960494DF}">
-                  <a14:hiddenLine xmlns="" xmlns:a14="http://schemas.microsoft.com/office/drawing/2010/main" w="9525">
+                  <a14:hiddenLine xmlns:a14="http://schemas.microsoft.com/office/drawing/2010/main" xmlns="" w="9525">
                     <a:solidFill>
                       <a:srgbClr val="000000"/>
                     </a:solidFill>
@@ -10537,7 +10537,7 @@
               </a:ln>
               <a:extLst>
                 <a:ext uri="{91240B29-F687-4f45-9708-019B960494DF}">
-                  <a14:hiddenLine xmlns="" xmlns:a14="http://schemas.microsoft.com/office/drawing/2010/main" w="9525">
+                  <a14:hiddenLine xmlns:a14="http://schemas.microsoft.com/office/drawing/2010/main" xmlns="" w="9525">
                     <a:solidFill>
                       <a:srgbClr val="000000"/>
                     </a:solidFill>
@@ -10599,7 +10599,7 @@
               </a:ln>
               <a:extLst>
                 <a:ext uri="{91240B29-F687-4f45-9708-019B960494DF}">
-                  <a14:hiddenLine xmlns="" xmlns:a14="http://schemas.microsoft.com/office/drawing/2010/main" w="9525">
+                  <a14:hiddenLine xmlns:a14="http://schemas.microsoft.com/office/drawing/2010/main" xmlns="" w="9525">
                     <a:solidFill>
                       <a:srgbClr val="000000"/>
                     </a:solidFill>
@@ -10689,7 +10689,7 @@
               </a:ln>
               <a:extLst>
                 <a:ext uri="{91240B29-F687-4f45-9708-019B960494DF}">
-                  <a14:hiddenLine xmlns="" xmlns:a14="http://schemas.microsoft.com/office/drawing/2010/main" w="9525">
+                  <a14:hiddenLine xmlns:a14="http://schemas.microsoft.com/office/drawing/2010/main" xmlns="" w="9525">
                     <a:solidFill>
                       <a:srgbClr val="000000"/>
                     </a:solidFill>
@@ -10754,7 +10754,7 @@
               </a:ln>
               <a:extLst>
                 <a:ext uri="{91240B29-F687-4f45-9708-019B960494DF}">
-                  <a14:hiddenLine xmlns="" xmlns:a14="http://schemas.microsoft.com/office/drawing/2010/main" w="9525">
+                  <a14:hiddenLine xmlns:a14="http://schemas.microsoft.com/office/drawing/2010/main" xmlns="" w="9525">
                     <a:solidFill>
                       <a:srgbClr val="000000"/>
                     </a:solidFill>
@@ -10816,7 +10816,7 @@
               </a:ln>
               <a:extLst>
                 <a:ext uri="{91240B29-F687-4f45-9708-019B960494DF}">
-                  <a14:hiddenLine xmlns="" xmlns:a14="http://schemas.microsoft.com/office/drawing/2010/main" w="9525">
+                  <a14:hiddenLine xmlns:a14="http://schemas.microsoft.com/office/drawing/2010/main" xmlns="" w="9525">
                     <a:solidFill>
                       <a:srgbClr val="000000"/>
                     </a:solidFill>
@@ -10906,7 +10906,7 @@
               </a:ln>
               <a:extLst>
                 <a:ext uri="{91240B29-F687-4f45-9708-019B960494DF}">
-                  <a14:hiddenLine xmlns="" xmlns:a14="http://schemas.microsoft.com/office/drawing/2010/main" w="9525">
+                  <a14:hiddenLine xmlns:a14="http://schemas.microsoft.com/office/drawing/2010/main" xmlns="" w="9525">
                     <a:solidFill>
                       <a:srgbClr val="000000"/>
                     </a:solidFill>
@@ -10996,7 +10996,7 @@
               </a:ln>
               <a:extLst>
                 <a:ext uri="{91240B29-F687-4f45-9708-019B960494DF}">
-                  <a14:hiddenLine xmlns="" xmlns:a14="http://schemas.microsoft.com/office/drawing/2010/main" w="9525">
+                  <a14:hiddenLine xmlns:a14="http://schemas.microsoft.com/office/drawing/2010/main" xmlns="" w="9525">
                     <a:solidFill>
                       <a:srgbClr val="000000"/>
                     </a:solidFill>
@@ -11061,7 +11061,7 @@
               </a:ln>
               <a:extLst>
                 <a:ext uri="{91240B29-F687-4f45-9708-019B960494DF}">
-                  <a14:hiddenLine xmlns="" xmlns:a14="http://schemas.microsoft.com/office/drawing/2010/main" w="9525">
+                  <a14:hiddenLine xmlns:a14="http://schemas.microsoft.com/office/drawing/2010/main" xmlns="" w="9525">
                     <a:solidFill>
                       <a:srgbClr val="000000"/>
                     </a:solidFill>
@@ -11181,7 +11181,7 @@
               </a:ln>
               <a:extLst>
                 <a:ext uri="{91240B29-F687-4f45-9708-019B960494DF}">
-                  <a14:hiddenLine xmlns="" xmlns:a14="http://schemas.microsoft.com/office/drawing/2010/main" w="9525">
+                  <a14:hiddenLine xmlns:a14="http://schemas.microsoft.com/office/drawing/2010/main" xmlns="" w="9525">
                     <a:solidFill>
                       <a:srgbClr val="000000"/>
                     </a:solidFill>
@@ -11262,7 +11262,7 @@
               </a:ln>
               <a:extLst>
                 <a:ext uri="{91240B29-F687-4f45-9708-019B960494DF}">
-                  <a14:hiddenLine xmlns="" xmlns:a14="http://schemas.microsoft.com/office/drawing/2010/main" w="9525">
+                  <a14:hiddenLine xmlns:a14="http://schemas.microsoft.com/office/drawing/2010/main" xmlns="" w="9525">
                     <a:solidFill>
                       <a:srgbClr val="000000"/>
                     </a:solidFill>
@@ -11377,7 +11377,7 @@
               </a:ln>
               <a:extLst>
                 <a:ext uri="{91240B29-F687-4f45-9708-019B960494DF}">
-                  <a14:hiddenLine xmlns="" xmlns:a14="http://schemas.microsoft.com/office/drawing/2010/main" w="9525">
+                  <a14:hiddenLine xmlns:a14="http://schemas.microsoft.com/office/drawing/2010/main" xmlns="" w="9525">
                     <a:solidFill>
                       <a:srgbClr val="000000"/>
                     </a:solidFill>
@@ -11467,7 +11467,7 @@
               </a:ln>
               <a:extLst>
                 <a:ext uri="{91240B29-F687-4f45-9708-019B960494DF}">
-                  <a14:hiddenLine xmlns="" xmlns:a14="http://schemas.microsoft.com/office/drawing/2010/main" w="9525">
+                  <a14:hiddenLine xmlns:a14="http://schemas.microsoft.com/office/drawing/2010/main" xmlns="" w="9525">
                     <a:solidFill>
                       <a:srgbClr val="000000"/>
                     </a:solidFill>
@@ -11532,7 +11532,7 @@
               </a:ln>
               <a:extLst>
                 <a:ext uri="{91240B29-F687-4f45-9708-019B960494DF}">
-                  <a14:hiddenLine xmlns="" xmlns:a14="http://schemas.microsoft.com/office/drawing/2010/main" w="9525">
+                  <a14:hiddenLine xmlns:a14="http://schemas.microsoft.com/office/drawing/2010/main" xmlns="" w="9525">
                     <a:solidFill>
                       <a:srgbClr val="000000"/>
                     </a:solidFill>
@@ -11622,7 +11622,7 @@
               </a:ln>
               <a:extLst>
                 <a:ext uri="{91240B29-F687-4f45-9708-019B960494DF}">
-                  <a14:hiddenLine xmlns="" xmlns:a14="http://schemas.microsoft.com/office/drawing/2010/main" w="9525">
+                  <a14:hiddenLine xmlns:a14="http://schemas.microsoft.com/office/drawing/2010/main" xmlns="" w="9525">
                     <a:solidFill>
                       <a:srgbClr val="000000"/>
                     </a:solidFill>
@@ -11690,7 +11690,7 @@
               </a:ln>
               <a:extLst>
                 <a:ext uri="{91240B29-F687-4f45-9708-019B960494DF}">
-                  <a14:hiddenLine xmlns="" xmlns:a14="http://schemas.microsoft.com/office/drawing/2010/main" w="9525">
+                  <a14:hiddenLine xmlns:a14="http://schemas.microsoft.com/office/drawing/2010/main" xmlns="" w="9525">
                     <a:solidFill>
                       <a:srgbClr val="000000"/>
                     </a:solidFill>
@@ -11780,7 +11780,7 @@
               </a:ln>
               <a:extLst>
                 <a:ext uri="{91240B29-F687-4f45-9708-019B960494DF}">
-                  <a14:hiddenLine xmlns="" xmlns:a14="http://schemas.microsoft.com/office/drawing/2010/main" w="9525">
+                  <a14:hiddenLine xmlns:a14="http://schemas.microsoft.com/office/drawing/2010/main" xmlns="" w="9525">
                     <a:solidFill>
                       <a:srgbClr val="000000"/>
                     </a:solidFill>
@@ -11848,7 +11848,7 @@
               </a:ln>
               <a:extLst>
                 <a:ext uri="{91240B29-F687-4f45-9708-019B960494DF}">
-                  <a14:hiddenLine xmlns="" xmlns:a14="http://schemas.microsoft.com/office/drawing/2010/main" w="9525">
+                  <a14:hiddenLine xmlns:a14="http://schemas.microsoft.com/office/drawing/2010/main" xmlns="" w="9525">
                     <a:solidFill>
                       <a:srgbClr val="000000"/>
                     </a:solidFill>
@@ -11938,7 +11938,7 @@
               </a:ln>
               <a:extLst>
                 <a:ext uri="{91240B29-F687-4f45-9708-019B960494DF}">
-                  <a14:hiddenLine xmlns="" xmlns:a14="http://schemas.microsoft.com/office/drawing/2010/main" w="9525">
+                  <a14:hiddenLine xmlns:a14="http://schemas.microsoft.com/office/drawing/2010/main" xmlns="" w="9525">
                     <a:solidFill>
                       <a:srgbClr val="000000"/>
                     </a:solidFill>
@@ -11972,7 +11972,7 @@
               </a:ln>
               <a:extLst>
                 <a:ext uri="{91240B29-F687-4f45-9708-019B960494DF}">
-                  <a14:hiddenLine xmlns="" xmlns:a14="http://schemas.microsoft.com/office/drawing/2010/main" w="9525">
+                  <a14:hiddenLine xmlns:a14="http://schemas.microsoft.com/office/drawing/2010/main" xmlns="" w="9525">
                     <a:solidFill>
                       <a:srgbClr val="000000"/>
                     </a:solidFill>
@@ -12112,7 +12112,7 @@
             <a:fld id="{B61BEF0D-F0BB-DE4B-95CE-6DB70DBA9567}" type="datetimeFigureOut">
               <a:rPr lang="en-US" smtClean="0"/>
               <a:pPr/>
-              <a:t>10/17/19</a:t>
+              <a:t>10/21/19</a:t>
             </a:fld>
             <a:endParaRPr lang="en-US" dirty="0"/>
           </a:p>
@@ -13175,7 +13175,7 @@
           <a:noFill/>
           <a:extLst>
             <a:ext uri="{909E8E84-426E-40dd-AFC4-6F175D3DCCD1}">
-              <a14:hiddenFill xmlns="" xmlns:a16="http://schemas.microsoft.com/office/drawing/2014/main" xmlns:p14="http://schemas.microsoft.com/office/powerpoint/2010/main" xmlns:a14="http://schemas.microsoft.com/office/drawing/2010/main">
+              <a14:hiddenFill xmlns:a14="http://schemas.microsoft.com/office/drawing/2010/main" xmlns:p14="http://schemas.microsoft.com/office/powerpoint/2010/main" xmlns:a16="http://schemas.microsoft.com/office/drawing/2014/main" xmlns="">
                 <a:solidFill>
                   <a:srgbClr val="FFFFFF"/>
                 </a:solidFill>
@@ -13266,7 +13266,7 @@
             </a:ln>
             <a:extLst>
               <a:ext uri="{91240B29-F687-4f45-9708-019B960494DF}">
-                <a14:hiddenLine xmlns="" xmlns:a16="http://schemas.microsoft.com/office/drawing/2014/main" xmlns:p14="http://schemas.microsoft.com/office/powerpoint/2010/main" xmlns:a14="http://schemas.microsoft.com/office/drawing/2010/main" w="9525">
+                <a14:hiddenLine xmlns:a14="http://schemas.microsoft.com/office/drawing/2010/main" xmlns:p14="http://schemas.microsoft.com/office/powerpoint/2010/main" xmlns:a16="http://schemas.microsoft.com/office/drawing/2014/main" xmlns="" w="9525">
                   <a:solidFill>
                     <a:srgbClr val="000000"/>
                   </a:solidFill>
@@ -13371,7 +13371,7 @@
             </a:ln>
             <a:extLst>
               <a:ext uri="{91240B29-F687-4f45-9708-019B960494DF}">
-                <a14:hiddenLine xmlns="" xmlns:a16="http://schemas.microsoft.com/office/drawing/2014/main" xmlns:p14="http://schemas.microsoft.com/office/powerpoint/2010/main" xmlns:a14="http://schemas.microsoft.com/office/drawing/2010/main" w="9525">
+                <a14:hiddenLine xmlns:a14="http://schemas.microsoft.com/office/drawing/2010/main" xmlns:p14="http://schemas.microsoft.com/office/powerpoint/2010/main" xmlns:a16="http://schemas.microsoft.com/office/drawing/2014/main" xmlns="" w="9525">
                   <a:solidFill>
                     <a:srgbClr val="000000"/>
                   </a:solidFill>
@@ -13476,7 +13476,7 @@
             </a:ln>
             <a:extLst>
               <a:ext uri="{91240B29-F687-4f45-9708-019B960494DF}">
-                <a14:hiddenLine xmlns="" xmlns:a16="http://schemas.microsoft.com/office/drawing/2014/main" xmlns:p14="http://schemas.microsoft.com/office/powerpoint/2010/main" xmlns:a14="http://schemas.microsoft.com/office/drawing/2010/main" w="9525">
+                <a14:hiddenLine xmlns:a14="http://schemas.microsoft.com/office/drawing/2010/main" xmlns:p14="http://schemas.microsoft.com/office/powerpoint/2010/main" xmlns:a16="http://schemas.microsoft.com/office/drawing/2014/main" xmlns="" w="9525">
                   <a:solidFill>
                     <a:srgbClr val="000000"/>
                   </a:solidFill>
@@ -13525,7 +13525,7 @@
             </a:ln>
             <a:extLst>
               <a:ext uri="{91240B29-F687-4f45-9708-019B960494DF}">
-                <a14:hiddenLine xmlns="" xmlns:a16="http://schemas.microsoft.com/office/drawing/2014/main" xmlns:p14="http://schemas.microsoft.com/office/powerpoint/2010/main" xmlns:a14="http://schemas.microsoft.com/office/drawing/2010/main" w="9525">
+                <a14:hiddenLine xmlns:a14="http://schemas.microsoft.com/office/drawing/2010/main" xmlns:p14="http://schemas.microsoft.com/office/powerpoint/2010/main" xmlns:a16="http://schemas.microsoft.com/office/drawing/2014/main" xmlns="" w="9525">
                   <a:solidFill>
                     <a:srgbClr val="000000"/>
                   </a:solidFill>
@@ -13630,7 +13630,7 @@
             </a:ln>
             <a:extLst>
               <a:ext uri="{91240B29-F687-4f45-9708-019B960494DF}">
-                <a14:hiddenLine xmlns="" xmlns:a16="http://schemas.microsoft.com/office/drawing/2014/main" xmlns:p14="http://schemas.microsoft.com/office/powerpoint/2010/main" xmlns:a14="http://schemas.microsoft.com/office/drawing/2010/main" w="9525">
+                <a14:hiddenLine xmlns:a14="http://schemas.microsoft.com/office/drawing/2010/main" xmlns:p14="http://schemas.microsoft.com/office/powerpoint/2010/main" xmlns:a16="http://schemas.microsoft.com/office/drawing/2014/main" xmlns="" w="9525">
                   <a:solidFill>
                     <a:srgbClr val="000000"/>
                   </a:solidFill>
@@ -13707,7 +13707,7 @@
             </a:ln>
             <a:extLst>
               <a:ext uri="{91240B29-F687-4f45-9708-019B960494DF}">
-                <a14:hiddenLine xmlns="" xmlns:a16="http://schemas.microsoft.com/office/drawing/2014/main" xmlns:p14="http://schemas.microsoft.com/office/powerpoint/2010/main" xmlns:a14="http://schemas.microsoft.com/office/drawing/2010/main" w="9525">
+                <a14:hiddenLine xmlns:a14="http://schemas.microsoft.com/office/drawing/2010/main" xmlns:p14="http://schemas.microsoft.com/office/powerpoint/2010/main" xmlns:a16="http://schemas.microsoft.com/office/drawing/2014/main" xmlns="" w="9525">
                   <a:solidFill>
                     <a:srgbClr val="000000"/>
                   </a:solidFill>
@@ -13784,7 +13784,7 @@
             </a:ln>
             <a:extLst>
               <a:ext uri="{91240B29-F687-4f45-9708-019B960494DF}">
-                <a14:hiddenLine xmlns="" xmlns:a16="http://schemas.microsoft.com/office/drawing/2014/main" xmlns:p14="http://schemas.microsoft.com/office/powerpoint/2010/main" xmlns:a14="http://schemas.microsoft.com/office/drawing/2010/main" w="9525">
+                <a14:hiddenLine xmlns:a14="http://schemas.microsoft.com/office/drawing/2010/main" xmlns:p14="http://schemas.microsoft.com/office/powerpoint/2010/main" xmlns:a16="http://schemas.microsoft.com/office/drawing/2014/main" xmlns="" w="9525">
                   <a:solidFill>
                     <a:srgbClr val="000000"/>
                   </a:solidFill>
@@ -13889,7 +13889,7 @@
             </a:ln>
             <a:extLst>
               <a:ext uri="{91240B29-F687-4f45-9708-019B960494DF}">
-                <a14:hiddenLine xmlns="" xmlns:a16="http://schemas.microsoft.com/office/drawing/2014/main" xmlns:p14="http://schemas.microsoft.com/office/powerpoint/2010/main" xmlns:a14="http://schemas.microsoft.com/office/drawing/2010/main" w="9525">
+                <a14:hiddenLine xmlns:a14="http://schemas.microsoft.com/office/drawing/2010/main" xmlns:p14="http://schemas.microsoft.com/office/powerpoint/2010/main" xmlns:a16="http://schemas.microsoft.com/office/drawing/2014/main" xmlns="" w="9525">
                   <a:solidFill>
                     <a:srgbClr val="000000"/>
                   </a:solidFill>
@@ -13966,7 +13966,7 @@
             </a:ln>
             <a:extLst>
               <a:ext uri="{91240B29-F687-4f45-9708-019B960494DF}">
-                <a14:hiddenLine xmlns="" xmlns:a16="http://schemas.microsoft.com/office/drawing/2014/main" xmlns:p14="http://schemas.microsoft.com/office/powerpoint/2010/main" xmlns:a14="http://schemas.microsoft.com/office/drawing/2010/main" w="9525">
+                <a14:hiddenLine xmlns:a14="http://schemas.microsoft.com/office/drawing/2010/main" xmlns:p14="http://schemas.microsoft.com/office/powerpoint/2010/main" xmlns:a16="http://schemas.microsoft.com/office/drawing/2014/main" xmlns="" w="9525">
                   <a:solidFill>
                     <a:srgbClr val="000000"/>
                   </a:solidFill>
@@ -14043,7 +14043,7 @@
             </a:ln>
             <a:extLst>
               <a:ext uri="{91240B29-F687-4f45-9708-019B960494DF}">
-                <a14:hiddenLine xmlns="" xmlns:a16="http://schemas.microsoft.com/office/drawing/2014/main" xmlns:p14="http://schemas.microsoft.com/office/powerpoint/2010/main" xmlns:a14="http://schemas.microsoft.com/office/drawing/2010/main" w="9525">
+                <a14:hiddenLine xmlns:a14="http://schemas.microsoft.com/office/drawing/2010/main" xmlns:p14="http://schemas.microsoft.com/office/powerpoint/2010/main" xmlns:a16="http://schemas.microsoft.com/office/drawing/2014/main" xmlns="" w="9525">
                   <a:solidFill>
                     <a:srgbClr val="000000"/>
                   </a:solidFill>
@@ -14148,7 +14148,7 @@
             </a:ln>
             <a:extLst>
               <a:ext uri="{91240B29-F687-4f45-9708-019B960494DF}">
-                <a14:hiddenLine xmlns="" xmlns:a16="http://schemas.microsoft.com/office/drawing/2014/main" xmlns:p14="http://schemas.microsoft.com/office/powerpoint/2010/main" xmlns:a14="http://schemas.microsoft.com/office/drawing/2010/main" w="9525">
+                <a14:hiddenLine xmlns:a14="http://schemas.microsoft.com/office/drawing/2010/main" xmlns:p14="http://schemas.microsoft.com/office/powerpoint/2010/main" xmlns:a16="http://schemas.microsoft.com/office/drawing/2014/main" xmlns="" w="9525">
                   <a:solidFill>
                     <a:srgbClr val="000000"/>
                   </a:solidFill>
@@ -14253,7 +14253,7 @@
             </a:ln>
             <a:extLst>
               <a:ext uri="{91240B29-F687-4f45-9708-019B960494DF}">
-                <a14:hiddenLine xmlns="" xmlns:a16="http://schemas.microsoft.com/office/drawing/2014/main" xmlns:p14="http://schemas.microsoft.com/office/powerpoint/2010/main" xmlns:a14="http://schemas.microsoft.com/office/drawing/2010/main" w="9525">
+                <a14:hiddenLine xmlns:a14="http://schemas.microsoft.com/office/drawing/2010/main" xmlns:p14="http://schemas.microsoft.com/office/powerpoint/2010/main" xmlns:a16="http://schemas.microsoft.com/office/drawing/2014/main" xmlns="" w="9525">
                   <a:solidFill>
                     <a:srgbClr val="000000"/>
                   </a:solidFill>
@@ -14330,7 +14330,7 @@
             </a:ln>
             <a:extLst>
               <a:ext uri="{91240B29-F687-4f45-9708-019B960494DF}">
-                <a14:hiddenLine xmlns="" xmlns:a16="http://schemas.microsoft.com/office/drawing/2014/main" xmlns:p14="http://schemas.microsoft.com/office/powerpoint/2010/main" xmlns:a14="http://schemas.microsoft.com/office/drawing/2010/main" w="9525">
+                <a14:hiddenLine xmlns:a14="http://schemas.microsoft.com/office/drawing/2010/main" xmlns:p14="http://schemas.microsoft.com/office/powerpoint/2010/main" xmlns:a16="http://schemas.microsoft.com/office/drawing/2014/main" xmlns="" w="9525">
                   <a:solidFill>
                     <a:srgbClr val="000000"/>
                   </a:solidFill>
@@ -14455,7 +14455,7 @@
             </a:ln>
             <a:extLst>
               <a:ext uri="{91240B29-F687-4f45-9708-019B960494DF}">
-                <a14:hiddenLine xmlns="" xmlns:a16="http://schemas.microsoft.com/office/drawing/2014/main" xmlns:p14="http://schemas.microsoft.com/office/powerpoint/2010/main" xmlns:a14="http://schemas.microsoft.com/office/drawing/2010/main" w="9525">
+                <a14:hiddenLine xmlns:a14="http://schemas.microsoft.com/office/drawing/2010/main" xmlns:p14="http://schemas.microsoft.com/office/powerpoint/2010/main" xmlns:a16="http://schemas.microsoft.com/office/drawing/2014/main" xmlns="" w="9525">
                   <a:solidFill>
                     <a:srgbClr val="000000"/>
                   </a:solidFill>
@@ -14532,7 +14532,7 @@
             </a:ln>
             <a:extLst>
               <a:ext uri="{91240B29-F687-4f45-9708-019B960494DF}">
-                <a14:hiddenLine xmlns="" xmlns:a16="http://schemas.microsoft.com/office/drawing/2014/main" xmlns:p14="http://schemas.microsoft.com/office/powerpoint/2010/main" xmlns:a14="http://schemas.microsoft.com/office/drawing/2010/main" w="9525">
+                <a14:hiddenLine xmlns:a14="http://schemas.microsoft.com/office/drawing/2010/main" xmlns:p14="http://schemas.microsoft.com/office/powerpoint/2010/main" xmlns:a16="http://schemas.microsoft.com/office/drawing/2014/main" xmlns="" w="9525">
                   <a:solidFill>
                     <a:srgbClr val="000000"/>
                   </a:solidFill>
@@ -14637,7 +14637,7 @@
             </a:ln>
             <a:extLst>
               <a:ext uri="{91240B29-F687-4f45-9708-019B960494DF}">
-                <a14:hiddenLine xmlns="" xmlns:a16="http://schemas.microsoft.com/office/drawing/2014/main" xmlns:p14="http://schemas.microsoft.com/office/powerpoint/2010/main" xmlns:a14="http://schemas.microsoft.com/office/drawing/2010/main" w="9525">
+                <a14:hiddenLine xmlns:a14="http://schemas.microsoft.com/office/drawing/2010/main" xmlns:p14="http://schemas.microsoft.com/office/powerpoint/2010/main" xmlns:a16="http://schemas.microsoft.com/office/drawing/2014/main" xmlns="" w="9525">
                   <a:solidFill>
                     <a:srgbClr val="000000"/>
                   </a:solidFill>
@@ -14742,7 +14742,7 @@
             </a:ln>
             <a:extLst>
               <a:ext uri="{91240B29-F687-4f45-9708-019B960494DF}">
-                <a14:hiddenLine xmlns="" xmlns:a16="http://schemas.microsoft.com/office/drawing/2014/main" xmlns:p14="http://schemas.microsoft.com/office/powerpoint/2010/main" xmlns:a14="http://schemas.microsoft.com/office/drawing/2010/main" w="9525">
+                <a14:hiddenLine xmlns:a14="http://schemas.microsoft.com/office/drawing/2010/main" xmlns:p14="http://schemas.microsoft.com/office/powerpoint/2010/main" xmlns:a16="http://schemas.microsoft.com/office/drawing/2014/main" xmlns="" w="9525">
                   <a:solidFill>
                     <a:srgbClr val="000000"/>
                   </a:solidFill>
@@ -14819,7 +14819,7 @@
             </a:ln>
             <a:extLst>
               <a:ext uri="{91240B29-F687-4f45-9708-019B960494DF}">
-                <a14:hiddenLine xmlns="" xmlns:a16="http://schemas.microsoft.com/office/drawing/2014/main" xmlns:p14="http://schemas.microsoft.com/office/powerpoint/2010/main" xmlns:a14="http://schemas.microsoft.com/office/drawing/2010/main" w="9525">
+                <a14:hiddenLine xmlns:a14="http://schemas.microsoft.com/office/drawing/2010/main" xmlns:p14="http://schemas.microsoft.com/office/powerpoint/2010/main" xmlns:a16="http://schemas.microsoft.com/office/drawing/2014/main" xmlns="" w="9525">
                   <a:solidFill>
                     <a:srgbClr val="000000"/>
                   </a:solidFill>
@@ -14924,7 +14924,7 @@
             </a:ln>
             <a:extLst>
               <a:ext uri="{91240B29-F687-4f45-9708-019B960494DF}">
-                <a14:hiddenLine xmlns="" xmlns:a16="http://schemas.microsoft.com/office/drawing/2014/main" xmlns:p14="http://schemas.microsoft.com/office/powerpoint/2010/main" xmlns:a14="http://schemas.microsoft.com/office/drawing/2010/main" w="9525">
+                <a14:hiddenLine xmlns:a14="http://schemas.microsoft.com/office/drawing/2010/main" xmlns:p14="http://schemas.microsoft.com/office/powerpoint/2010/main" xmlns:a16="http://schemas.microsoft.com/office/drawing/2014/main" xmlns="" w="9525">
                   <a:solidFill>
                     <a:srgbClr val="000000"/>
                   </a:solidFill>
@@ -15029,7 +15029,7 @@
             </a:ln>
             <a:extLst>
               <a:ext uri="{91240B29-F687-4f45-9708-019B960494DF}">
-                <a14:hiddenLine xmlns="" xmlns:a16="http://schemas.microsoft.com/office/drawing/2014/main" xmlns:p14="http://schemas.microsoft.com/office/powerpoint/2010/main" xmlns:a14="http://schemas.microsoft.com/office/drawing/2010/main" w="9525">
+                <a14:hiddenLine xmlns:a14="http://schemas.microsoft.com/office/drawing/2010/main" xmlns:p14="http://schemas.microsoft.com/office/powerpoint/2010/main" xmlns:a16="http://schemas.microsoft.com/office/drawing/2014/main" xmlns="" w="9525">
                   <a:solidFill>
                     <a:srgbClr val="000000"/>
                   </a:solidFill>
@@ -15100,7 +15100,7 @@
             </a:ln>
             <a:extLst>
               <a:ext uri="{91240B29-F687-4f45-9708-019B960494DF}">
-                <a14:hiddenLine xmlns="" xmlns:a16="http://schemas.microsoft.com/office/drawing/2014/main" xmlns:p14="http://schemas.microsoft.com/office/powerpoint/2010/main" xmlns:a14="http://schemas.microsoft.com/office/drawing/2010/main" w="9525">
+                <a14:hiddenLine xmlns:a14="http://schemas.microsoft.com/office/drawing/2010/main" xmlns:p14="http://schemas.microsoft.com/office/powerpoint/2010/main" xmlns:a16="http://schemas.microsoft.com/office/drawing/2014/main" xmlns="" w="9525">
                   <a:solidFill>
                     <a:srgbClr val="000000"/>
                   </a:solidFill>
@@ -15205,7 +15205,7 @@
             </a:ln>
             <a:extLst>
               <a:ext uri="{91240B29-F687-4f45-9708-019B960494DF}">
-                <a14:hiddenLine xmlns="" xmlns:a16="http://schemas.microsoft.com/office/drawing/2014/main" xmlns:p14="http://schemas.microsoft.com/office/powerpoint/2010/main" xmlns:a14="http://schemas.microsoft.com/office/drawing/2010/main" w="9525">
+                <a14:hiddenLine xmlns:a14="http://schemas.microsoft.com/office/drawing/2010/main" xmlns:p14="http://schemas.microsoft.com/office/powerpoint/2010/main" xmlns:a16="http://schemas.microsoft.com/office/drawing/2014/main" xmlns="" w="9525">
                   <a:solidFill>
                     <a:srgbClr val="000000"/>
                   </a:solidFill>
@@ -15276,7 +15276,7 @@
             </a:ln>
             <a:extLst>
               <a:ext uri="{91240B29-F687-4f45-9708-019B960494DF}">
-                <a14:hiddenLine xmlns="" xmlns:a16="http://schemas.microsoft.com/office/drawing/2014/main" xmlns:p14="http://schemas.microsoft.com/office/powerpoint/2010/main" xmlns:a14="http://schemas.microsoft.com/office/drawing/2010/main" w="9525">
+                <a14:hiddenLine xmlns:a14="http://schemas.microsoft.com/office/drawing/2010/main" xmlns:p14="http://schemas.microsoft.com/office/powerpoint/2010/main" xmlns:a16="http://schemas.microsoft.com/office/drawing/2014/main" xmlns="" w="9525">
                   <a:solidFill>
                     <a:srgbClr val="000000"/>
                   </a:solidFill>
@@ -15381,7 +15381,7 @@
             </a:ln>
             <a:extLst>
               <a:ext uri="{91240B29-F687-4f45-9708-019B960494DF}">
-                <a14:hiddenLine xmlns="" xmlns:a16="http://schemas.microsoft.com/office/drawing/2014/main" xmlns:p14="http://schemas.microsoft.com/office/powerpoint/2010/main" xmlns:a14="http://schemas.microsoft.com/office/drawing/2010/main" w="9525">
+                <a14:hiddenLine xmlns:a14="http://schemas.microsoft.com/office/drawing/2010/main" xmlns:p14="http://schemas.microsoft.com/office/powerpoint/2010/main" xmlns:a16="http://schemas.microsoft.com/office/drawing/2014/main" xmlns="" w="9525">
                   <a:solidFill>
                     <a:srgbClr val="000000"/>
                   </a:solidFill>
@@ -15464,7 +15464,7 @@
             </a:ln>
             <a:extLst>
               <a:ext uri="{91240B29-F687-4f45-9708-019B960494DF}">
-                <a14:hiddenLine xmlns="" xmlns:a16="http://schemas.microsoft.com/office/drawing/2014/main" xmlns:p14="http://schemas.microsoft.com/office/powerpoint/2010/main" xmlns:a14="http://schemas.microsoft.com/office/drawing/2010/main" w="9525">
+                <a14:hiddenLine xmlns:a14="http://schemas.microsoft.com/office/drawing/2010/main" xmlns:p14="http://schemas.microsoft.com/office/powerpoint/2010/main" xmlns:a16="http://schemas.microsoft.com/office/drawing/2014/main" xmlns="" w="9525">
                   <a:solidFill>
                     <a:srgbClr val="000000"/>
                   </a:solidFill>
@@ -15569,7 +15569,7 @@
             </a:ln>
             <a:extLst>
               <a:ext uri="{91240B29-F687-4f45-9708-019B960494DF}">
-                <a14:hiddenLine xmlns="" xmlns:a16="http://schemas.microsoft.com/office/drawing/2014/main" xmlns:p14="http://schemas.microsoft.com/office/powerpoint/2010/main" xmlns:a14="http://schemas.microsoft.com/office/drawing/2010/main" w="9525">
+                <a14:hiddenLine xmlns:a14="http://schemas.microsoft.com/office/drawing/2010/main" xmlns:p14="http://schemas.microsoft.com/office/powerpoint/2010/main" xmlns:a16="http://schemas.microsoft.com/office/drawing/2014/main" xmlns="" w="9525">
                   <a:solidFill>
                     <a:srgbClr val="000000"/>
                   </a:solidFill>
@@ -15652,7 +15652,7 @@
             </a:ln>
             <a:extLst>
               <a:ext uri="{91240B29-F687-4f45-9708-019B960494DF}">
-                <a14:hiddenLine xmlns="" xmlns:a16="http://schemas.microsoft.com/office/drawing/2014/main" xmlns:p14="http://schemas.microsoft.com/office/powerpoint/2010/main" xmlns:a14="http://schemas.microsoft.com/office/drawing/2010/main" w="9525">
+                <a14:hiddenLine xmlns:a14="http://schemas.microsoft.com/office/drawing/2010/main" xmlns:p14="http://schemas.microsoft.com/office/powerpoint/2010/main" xmlns:a16="http://schemas.microsoft.com/office/drawing/2014/main" xmlns="" w="9525">
                   <a:solidFill>
                     <a:srgbClr val="000000"/>
                   </a:solidFill>
@@ -15757,7 +15757,7 @@
             </a:ln>
             <a:extLst>
               <a:ext uri="{91240B29-F687-4f45-9708-019B960494DF}">
-                <a14:hiddenLine xmlns="" xmlns:a16="http://schemas.microsoft.com/office/drawing/2014/main" xmlns:p14="http://schemas.microsoft.com/office/powerpoint/2010/main" xmlns:a14="http://schemas.microsoft.com/office/drawing/2010/main" w="9525">
+                <a14:hiddenLine xmlns:a14="http://schemas.microsoft.com/office/drawing/2010/main" xmlns:p14="http://schemas.microsoft.com/office/powerpoint/2010/main" xmlns:a16="http://schemas.microsoft.com/office/drawing/2014/main" xmlns="" w="9525">
                   <a:solidFill>
                     <a:srgbClr val="000000"/>
                   </a:solidFill>
@@ -15806,7 +15806,7 @@
             </a:ln>
             <a:extLst>
               <a:ext uri="{91240B29-F687-4f45-9708-019B960494DF}">
-                <a14:hiddenLine xmlns="" xmlns:a16="http://schemas.microsoft.com/office/drawing/2014/main" xmlns:p14="http://schemas.microsoft.com/office/powerpoint/2010/main" xmlns:a14="http://schemas.microsoft.com/office/drawing/2010/main" w="9525">
+                <a14:hiddenLine xmlns:a14="http://schemas.microsoft.com/office/drawing/2010/main" xmlns:p14="http://schemas.microsoft.com/office/powerpoint/2010/main" xmlns:a16="http://schemas.microsoft.com/office/drawing/2014/main" xmlns="" w="9525">
                   <a:solidFill>
                     <a:srgbClr val="000000"/>
                   </a:solidFill>
@@ -15911,7 +15911,7 @@
             </a:ln>
             <a:extLst>
               <a:ext uri="{91240B29-F687-4f45-9708-019B960494DF}">
-                <a14:hiddenLine xmlns="" xmlns:a16="http://schemas.microsoft.com/office/drawing/2014/main" xmlns:p14="http://schemas.microsoft.com/office/powerpoint/2010/main" xmlns:a14="http://schemas.microsoft.com/office/drawing/2010/main" w="9525">
+                <a14:hiddenLine xmlns:a14="http://schemas.microsoft.com/office/drawing/2010/main" xmlns:p14="http://schemas.microsoft.com/office/powerpoint/2010/main" xmlns:a16="http://schemas.microsoft.com/office/drawing/2014/main" xmlns="" w="9525">
                   <a:solidFill>
                     <a:srgbClr val="000000"/>
                   </a:solidFill>
@@ -15988,7 +15988,7 @@
             </a:ln>
             <a:extLst>
               <a:ext uri="{91240B29-F687-4f45-9708-019B960494DF}">
-                <a14:hiddenLine xmlns="" xmlns:a16="http://schemas.microsoft.com/office/drawing/2014/main" xmlns:p14="http://schemas.microsoft.com/office/powerpoint/2010/main" xmlns:a14="http://schemas.microsoft.com/office/drawing/2010/main" w="9525">
+                <a14:hiddenLine xmlns:a14="http://schemas.microsoft.com/office/drawing/2010/main" xmlns:p14="http://schemas.microsoft.com/office/powerpoint/2010/main" xmlns:a16="http://schemas.microsoft.com/office/drawing/2014/main" xmlns="" w="9525">
                   <a:solidFill>
                     <a:srgbClr val="000000"/>
                   </a:solidFill>
@@ -16065,7 +16065,7 @@
             </a:ln>
             <a:extLst>
               <a:ext uri="{91240B29-F687-4f45-9708-019B960494DF}">
-                <a14:hiddenLine xmlns="" xmlns:a16="http://schemas.microsoft.com/office/drawing/2014/main" xmlns:p14="http://schemas.microsoft.com/office/powerpoint/2010/main" xmlns:a14="http://schemas.microsoft.com/office/drawing/2010/main" w="9525">
+                <a14:hiddenLine xmlns:a14="http://schemas.microsoft.com/office/drawing/2010/main" xmlns:p14="http://schemas.microsoft.com/office/powerpoint/2010/main" xmlns:a16="http://schemas.microsoft.com/office/drawing/2014/main" xmlns="" w="9525">
                   <a:solidFill>
                     <a:srgbClr val="000000"/>
                   </a:solidFill>
@@ -16170,7 +16170,7 @@
             </a:ln>
             <a:extLst>
               <a:ext uri="{91240B29-F687-4f45-9708-019B960494DF}">
-                <a14:hiddenLine xmlns="" xmlns:a16="http://schemas.microsoft.com/office/drawing/2014/main" xmlns:p14="http://schemas.microsoft.com/office/powerpoint/2010/main" xmlns:a14="http://schemas.microsoft.com/office/drawing/2010/main" w="9525">
+                <a14:hiddenLine xmlns:a14="http://schemas.microsoft.com/office/drawing/2010/main" xmlns:p14="http://schemas.microsoft.com/office/powerpoint/2010/main" xmlns:a16="http://schemas.microsoft.com/office/drawing/2014/main" xmlns="" w="9525">
                   <a:solidFill>
                     <a:srgbClr val="000000"/>
                   </a:solidFill>
@@ -16253,7 +16253,7 @@
             </a:ln>
             <a:extLst>
               <a:ext uri="{91240B29-F687-4f45-9708-019B960494DF}">
-                <a14:hiddenLine xmlns="" xmlns:a16="http://schemas.microsoft.com/office/drawing/2014/main" xmlns:p14="http://schemas.microsoft.com/office/powerpoint/2010/main" xmlns:a14="http://schemas.microsoft.com/office/drawing/2010/main" w="9525">
+                <a14:hiddenLine xmlns:a14="http://schemas.microsoft.com/office/drawing/2010/main" xmlns:p14="http://schemas.microsoft.com/office/powerpoint/2010/main" xmlns:a16="http://schemas.microsoft.com/office/drawing/2014/main" xmlns="" w="9525">
                   <a:solidFill>
                     <a:srgbClr val="000000"/>
                   </a:solidFill>
@@ -16330,7 +16330,7 @@
             </a:ln>
             <a:extLst>
               <a:ext uri="{91240B29-F687-4f45-9708-019B960494DF}">
-                <a14:hiddenLine xmlns="" xmlns:a16="http://schemas.microsoft.com/office/drawing/2014/main" xmlns:p14="http://schemas.microsoft.com/office/powerpoint/2010/main" xmlns:a14="http://schemas.microsoft.com/office/drawing/2010/main" w="9525">
+                <a14:hiddenLine xmlns:a14="http://schemas.microsoft.com/office/drawing/2010/main" xmlns:p14="http://schemas.microsoft.com/office/powerpoint/2010/main" xmlns:a16="http://schemas.microsoft.com/office/drawing/2014/main" xmlns="" w="9525">
                   <a:solidFill>
                     <a:srgbClr val="000000"/>
                   </a:solidFill>
@@ -16435,7 +16435,7 @@
             </a:ln>
             <a:extLst>
               <a:ext uri="{91240B29-F687-4f45-9708-019B960494DF}">
-                <a14:hiddenLine xmlns="" xmlns:a16="http://schemas.microsoft.com/office/drawing/2014/main" xmlns:p14="http://schemas.microsoft.com/office/powerpoint/2010/main" xmlns:a14="http://schemas.microsoft.com/office/drawing/2010/main" w="9525">
+                <a14:hiddenLine xmlns:a14="http://schemas.microsoft.com/office/drawing/2010/main" xmlns:p14="http://schemas.microsoft.com/office/powerpoint/2010/main" xmlns:a16="http://schemas.microsoft.com/office/drawing/2014/main" xmlns="" w="9525">
                   <a:solidFill>
                     <a:srgbClr val="000000"/>
                   </a:solidFill>
@@ -16512,7 +16512,7 @@
             </a:ln>
             <a:extLst>
               <a:ext uri="{91240B29-F687-4f45-9708-019B960494DF}">
-                <a14:hiddenLine xmlns="" xmlns:a16="http://schemas.microsoft.com/office/drawing/2014/main" xmlns:p14="http://schemas.microsoft.com/office/powerpoint/2010/main" xmlns:a14="http://schemas.microsoft.com/office/drawing/2010/main" w="9525">
+                <a14:hiddenLine xmlns:a14="http://schemas.microsoft.com/office/drawing/2010/main" xmlns:p14="http://schemas.microsoft.com/office/powerpoint/2010/main" xmlns:a16="http://schemas.microsoft.com/office/drawing/2014/main" xmlns="" w="9525">
                   <a:solidFill>
                     <a:srgbClr val="000000"/>
                   </a:solidFill>
@@ -16617,7 +16617,7 @@
             </a:ln>
             <a:extLst>
               <a:ext uri="{91240B29-F687-4f45-9708-019B960494DF}">
-                <a14:hiddenLine xmlns="" xmlns:a16="http://schemas.microsoft.com/office/drawing/2014/main" xmlns:p14="http://schemas.microsoft.com/office/powerpoint/2010/main" xmlns:a14="http://schemas.microsoft.com/office/drawing/2010/main" w="9525">
+                <a14:hiddenLine xmlns:a14="http://schemas.microsoft.com/office/drawing/2010/main" xmlns:p14="http://schemas.microsoft.com/office/powerpoint/2010/main" xmlns:a16="http://schemas.microsoft.com/office/drawing/2014/main" xmlns="" w="9525">
                   <a:solidFill>
                     <a:srgbClr val="000000"/>
                   </a:solidFill>
@@ -16694,7 +16694,7 @@
             </a:ln>
             <a:extLst>
               <a:ext uri="{91240B29-F687-4f45-9708-019B960494DF}">
-                <a14:hiddenLine xmlns="" xmlns:a16="http://schemas.microsoft.com/office/drawing/2014/main" xmlns:p14="http://schemas.microsoft.com/office/powerpoint/2010/main" xmlns:a14="http://schemas.microsoft.com/office/drawing/2010/main" w="9525">
+                <a14:hiddenLine xmlns:a14="http://schemas.microsoft.com/office/drawing/2010/main" xmlns:p14="http://schemas.microsoft.com/office/powerpoint/2010/main" xmlns:a16="http://schemas.microsoft.com/office/drawing/2014/main" xmlns="" w="9525">
                   <a:solidFill>
                     <a:srgbClr val="000000"/>
                   </a:solidFill>
@@ -16799,7 +16799,7 @@
             </a:ln>
             <a:extLst>
               <a:ext uri="{91240B29-F687-4f45-9708-019B960494DF}">
-                <a14:hiddenLine xmlns="" xmlns:a16="http://schemas.microsoft.com/office/drawing/2014/main" xmlns:p14="http://schemas.microsoft.com/office/powerpoint/2010/main" xmlns:a14="http://schemas.microsoft.com/office/drawing/2010/main" w="9525">
+                <a14:hiddenLine xmlns:a14="http://schemas.microsoft.com/office/drawing/2010/main" xmlns:p14="http://schemas.microsoft.com/office/powerpoint/2010/main" xmlns:a16="http://schemas.microsoft.com/office/drawing/2014/main" xmlns="" w="9525">
                   <a:solidFill>
                     <a:srgbClr val="000000"/>
                   </a:solidFill>
@@ -16848,7 +16848,7 @@
             </a:ln>
             <a:extLst>
               <a:ext uri="{91240B29-F687-4f45-9708-019B960494DF}">
-                <a14:hiddenLine xmlns="" xmlns:a16="http://schemas.microsoft.com/office/drawing/2014/main" xmlns:p14="http://schemas.microsoft.com/office/powerpoint/2010/main" xmlns:a14="http://schemas.microsoft.com/office/drawing/2010/main" w="9525">
+                <a14:hiddenLine xmlns:a14="http://schemas.microsoft.com/office/drawing/2010/main" xmlns:p14="http://schemas.microsoft.com/office/powerpoint/2010/main" xmlns:a16="http://schemas.microsoft.com/office/drawing/2014/main" xmlns="" w="9525">
                   <a:solidFill>
                     <a:srgbClr val="000000"/>
                   </a:solidFill>
@@ -16928,7 +16928,7 @@
             </a:ln>
             <a:extLst>
               <a:ext uri="{91240B29-F687-4f45-9708-019B960494DF}">
-                <a14:hiddenLine xmlns="" xmlns:a16="http://schemas.microsoft.com/office/drawing/2014/main" xmlns:p14="http://schemas.microsoft.com/office/powerpoint/2010/main" xmlns:a14="http://schemas.microsoft.com/office/drawing/2010/main" w="9525">
+                <a14:hiddenLine xmlns:a14="http://schemas.microsoft.com/office/drawing/2010/main" xmlns:p14="http://schemas.microsoft.com/office/powerpoint/2010/main" xmlns:a16="http://schemas.microsoft.com/office/drawing/2014/main" xmlns="" w="9525">
                   <a:solidFill>
                     <a:srgbClr val="000000"/>
                   </a:solidFill>
@@ -17033,7 +17033,7 @@
             </a:ln>
             <a:extLst>
               <a:ext uri="{91240B29-F687-4f45-9708-019B960494DF}">
-                <a14:hiddenLine xmlns="" xmlns:a16="http://schemas.microsoft.com/office/drawing/2014/main" xmlns:p14="http://schemas.microsoft.com/office/powerpoint/2010/main" xmlns:a14="http://schemas.microsoft.com/office/drawing/2010/main" w="9525">
+                <a14:hiddenLine xmlns:a14="http://schemas.microsoft.com/office/drawing/2010/main" xmlns:p14="http://schemas.microsoft.com/office/powerpoint/2010/main" xmlns:a16="http://schemas.microsoft.com/office/drawing/2014/main" xmlns="" w="9525">
                   <a:solidFill>
                     <a:srgbClr val="000000"/>
                   </a:solidFill>
@@ -17110,7 +17110,7 @@
             </a:ln>
             <a:extLst>
               <a:ext uri="{91240B29-F687-4f45-9708-019B960494DF}">
-                <a14:hiddenLine xmlns="" xmlns:a16="http://schemas.microsoft.com/office/drawing/2014/main" xmlns:p14="http://schemas.microsoft.com/office/powerpoint/2010/main" xmlns:a14="http://schemas.microsoft.com/office/drawing/2010/main" w="9525">
+                <a14:hiddenLine xmlns:a14="http://schemas.microsoft.com/office/drawing/2010/main" xmlns:p14="http://schemas.microsoft.com/office/powerpoint/2010/main" xmlns:a16="http://schemas.microsoft.com/office/drawing/2014/main" xmlns="" w="9525">
                   <a:solidFill>
                     <a:srgbClr val="000000"/>
                   </a:solidFill>
@@ -17215,7 +17215,7 @@
             </a:ln>
             <a:extLst>
               <a:ext uri="{91240B29-F687-4f45-9708-019B960494DF}">
-                <a14:hiddenLine xmlns="" xmlns:a16="http://schemas.microsoft.com/office/drawing/2014/main" xmlns:p14="http://schemas.microsoft.com/office/powerpoint/2010/main" xmlns:a14="http://schemas.microsoft.com/office/drawing/2010/main" w="9525">
+                <a14:hiddenLine xmlns:a14="http://schemas.microsoft.com/office/drawing/2010/main" xmlns:p14="http://schemas.microsoft.com/office/powerpoint/2010/main" xmlns:a16="http://schemas.microsoft.com/office/drawing/2014/main" xmlns="" w="9525">
                   <a:solidFill>
                     <a:srgbClr val="000000"/>
                   </a:solidFill>
@@ -17320,7 +17320,7 @@
             </a:ln>
             <a:extLst>
               <a:ext uri="{91240B29-F687-4f45-9708-019B960494DF}">
-                <a14:hiddenLine xmlns="" xmlns:a16="http://schemas.microsoft.com/office/drawing/2014/main" xmlns:p14="http://schemas.microsoft.com/office/powerpoint/2010/main" xmlns:a14="http://schemas.microsoft.com/office/drawing/2010/main" w="9525">
+                <a14:hiddenLine xmlns:a14="http://schemas.microsoft.com/office/drawing/2010/main" xmlns:p14="http://schemas.microsoft.com/office/powerpoint/2010/main" xmlns:a16="http://schemas.microsoft.com/office/drawing/2014/main" xmlns="" w="9525">
                   <a:solidFill>
                     <a:srgbClr val="000000"/>
                   </a:solidFill>
@@ -17400,7 +17400,7 @@
             </a:ln>
             <a:extLst>
               <a:ext uri="{91240B29-F687-4f45-9708-019B960494DF}">
-                <a14:hiddenLine xmlns="" xmlns:a16="http://schemas.microsoft.com/office/drawing/2014/main" xmlns:p14="http://schemas.microsoft.com/office/powerpoint/2010/main" xmlns:a14="http://schemas.microsoft.com/office/drawing/2010/main" w="9525">
+                <a14:hiddenLine xmlns:a14="http://schemas.microsoft.com/office/drawing/2010/main" xmlns:p14="http://schemas.microsoft.com/office/powerpoint/2010/main" xmlns:a16="http://schemas.microsoft.com/office/drawing/2014/main" xmlns="" w="9525">
                   <a:solidFill>
                     <a:srgbClr val="000000"/>
                   </a:solidFill>
@@ -17477,7 +17477,7 @@
             </a:ln>
             <a:extLst>
               <a:ext uri="{91240B29-F687-4f45-9708-019B960494DF}">
-                <a14:hiddenLine xmlns="" xmlns:a16="http://schemas.microsoft.com/office/drawing/2014/main" xmlns:p14="http://schemas.microsoft.com/office/powerpoint/2010/main" xmlns:a14="http://schemas.microsoft.com/office/drawing/2010/main" w="9525">
+                <a14:hiddenLine xmlns:a14="http://schemas.microsoft.com/office/drawing/2010/main" xmlns:p14="http://schemas.microsoft.com/office/powerpoint/2010/main" xmlns:a16="http://schemas.microsoft.com/office/drawing/2014/main" xmlns="" w="9525">
                   <a:solidFill>
                     <a:srgbClr val="000000"/>
                   </a:solidFill>
@@ -17582,7 +17582,7 @@
             </a:ln>
             <a:extLst>
               <a:ext uri="{91240B29-F687-4f45-9708-019B960494DF}">
-                <a14:hiddenLine xmlns="" xmlns:a16="http://schemas.microsoft.com/office/drawing/2014/main" xmlns:p14="http://schemas.microsoft.com/office/powerpoint/2010/main" xmlns:a14="http://schemas.microsoft.com/office/drawing/2010/main" w="9525">
+                <a14:hiddenLine xmlns:a14="http://schemas.microsoft.com/office/drawing/2010/main" xmlns:p14="http://schemas.microsoft.com/office/powerpoint/2010/main" xmlns:a16="http://schemas.microsoft.com/office/drawing/2014/main" xmlns="" w="9525">
                   <a:solidFill>
                     <a:srgbClr val="000000"/>
                   </a:solidFill>
@@ -17687,7 +17687,7 @@
             </a:ln>
             <a:extLst>
               <a:ext uri="{91240B29-F687-4f45-9708-019B960494DF}">
-                <a14:hiddenLine xmlns="" xmlns:a16="http://schemas.microsoft.com/office/drawing/2014/main" xmlns:p14="http://schemas.microsoft.com/office/powerpoint/2010/main" xmlns:a14="http://schemas.microsoft.com/office/drawing/2010/main" w="9525">
+                <a14:hiddenLine xmlns:a14="http://schemas.microsoft.com/office/drawing/2010/main" xmlns:p14="http://schemas.microsoft.com/office/powerpoint/2010/main" xmlns:a16="http://schemas.microsoft.com/office/drawing/2014/main" xmlns="" w="9525">
                   <a:solidFill>
                     <a:srgbClr val="000000"/>
                   </a:solidFill>
@@ -17764,7 +17764,7 @@
             </a:ln>
             <a:extLst>
               <a:ext uri="{91240B29-F687-4f45-9708-019B960494DF}">
-                <a14:hiddenLine xmlns="" xmlns:a16="http://schemas.microsoft.com/office/drawing/2014/main" xmlns:p14="http://schemas.microsoft.com/office/powerpoint/2010/main" xmlns:a14="http://schemas.microsoft.com/office/drawing/2010/main" w="9525">
+                <a14:hiddenLine xmlns:a14="http://schemas.microsoft.com/office/drawing/2010/main" xmlns:p14="http://schemas.microsoft.com/office/powerpoint/2010/main" xmlns:a16="http://schemas.microsoft.com/office/drawing/2014/main" xmlns="" w="9525">
                   <a:solidFill>
                     <a:srgbClr val="000000"/>
                   </a:solidFill>
@@ -17899,7 +17899,7 @@
             </a:ln>
             <a:extLst>
               <a:ext uri="{91240B29-F687-4f45-9708-019B960494DF}">
-                <a14:hiddenLine xmlns="" xmlns:a16="http://schemas.microsoft.com/office/drawing/2014/main" xmlns:p14="http://schemas.microsoft.com/office/powerpoint/2010/main" xmlns:a14="http://schemas.microsoft.com/office/drawing/2010/main" w="9525">
+                <a14:hiddenLine xmlns:a14="http://schemas.microsoft.com/office/drawing/2010/main" xmlns:p14="http://schemas.microsoft.com/office/powerpoint/2010/main" xmlns:a16="http://schemas.microsoft.com/office/drawing/2014/main" xmlns="" w="9525">
                   <a:solidFill>
                     <a:srgbClr val="000000"/>
                   </a:solidFill>
@@ -17982,7 +17982,7 @@
             </a:ln>
             <a:extLst>
               <a:ext uri="{91240B29-F687-4f45-9708-019B960494DF}">
-                <a14:hiddenLine xmlns="" xmlns:a16="http://schemas.microsoft.com/office/drawing/2014/main" xmlns:p14="http://schemas.microsoft.com/office/powerpoint/2010/main" xmlns:a14="http://schemas.microsoft.com/office/drawing/2010/main" w="9525">
+                <a14:hiddenLine xmlns:a14="http://schemas.microsoft.com/office/drawing/2010/main" xmlns:p14="http://schemas.microsoft.com/office/powerpoint/2010/main" xmlns:a16="http://schemas.microsoft.com/office/drawing/2014/main" xmlns="" w="9525">
                   <a:solidFill>
                     <a:srgbClr val="000000"/>
                   </a:solidFill>
@@ -18087,7 +18087,7 @@
             </a:ln>
             <a:extLst>
               <a:ext uri="{91240B29-F687-4f45-9708-019B960494DF}">
-                <a14:hiddenLine xmlns="" xmlns:a16="http://schemas.microsoft.com/office/drawing/2014/main" xmlns:p14="http://schemas.microsoft.com/office/powerpoint/2010/main" xmlns:a14="http://schemas.microsoft.com/office/drawing/2010/main" w="9525">
+                <a14:hiddenLine xmlns:a14="http://schemas.microsoft.com/office/drawing/2010/main" xmlns:p14="http://schemas.microsoft.com/office/powerpoint/2010/main" xmlns:a16="http://schemas.microsoft.com/office/drawing/2014/main" xmlns="" w="9525">
                   <a:solidFill>
                     <a:srgbClr val="000000"/>
                   </a:solidFill>
@@ -19251,7 +19251,7 @@
           <a:noFill/>
           <a:extLst>
             <a:ext uri="{909E8E84-426E-40dd-AFC4-6F175D3DCCD1}">
-              <a14:hiddenFill xmlns:a14="http://schemas.microsoft.com/office/drawing/2010/main" xmlns:p14="http://schemas.microsoft.com/office/powerpoint/2010/main" xmlns:a16="http://schemas.microsoft.com/office/drawing/2014/main" xmlns="">
+              <a14:hiddenFill xmlns="" xmlns:a16="http://schemas.microsoft.com/office/drawing/2014/main" xmlns:p14="http://schemas.microsoft.com/office/powerpoint/2010/main" xmlns:a14="http://schemas.microsoft.com/office/drawing/2010/main">
                 <a:solidFill>
                   <a:srgbClr val="FFFFFF"/>
                 </a:solidFill>
@@ -19333,7 +19333,7 @@
             </a:ln>
             <a:extLst>
               <a:ext uri="{91240B29-F687-4f45-9708-019B960494DF}">
-                <a14:hiddenLine xmlns:a14="http://schemas.microsoft.com/office/drawing/2010/main" xmlns:p14="http://schemas.microsoft.com/office/powerpoint/2010/main" xmlns:a16="http://schemas.microsoft.com/office/drawing/2014/main" xmlns="" w="9525">
+                <a14:hiddenLine xmlns="" xmlns:a16="http://schemas.microsoft.com/office/drawing/2014/main" xmlns:p14="http://schemas.microsoft.com/office/powerpoint/2010/main" xmlns:a14="http://schemas.microsoft.com/office/drawing/2010/main" w="9525">
                   <a:solidFill>
                     <a:srgbClr val="000000"/>
                   </a:solidFill>
@@ -19438,7 +19438,7 @@
             </a:ln>
             <a:extLst>
               <a:ext uri="{91240B29-F687-4f45-9708-019B960494DF}">
-                <a14:hiddenLine xmlns:a14="http://schemas.microsoft.com/office/drawing/2010/main" xmlns:p14="http://schemas.microsoft.com/office/powerpoint/2010/main" xmlns:a16="http://schemas.microsoft.com/office/drawing/2014/main" xmlns="" w="9525">
+                <a14:hiddenLine xmlns="" xmlns:a16="http://schemas.microsoft.com/office/drawing/2014/main" xmlns:p14="http://schemas.microsoft.com/office/powerpoint/2010/main" xmlns:a14="http://schemas.microsoft.com/office/drawing/2010/main" w="9525">
                   <a:solidFill>
                     <a:srgbClr val="000000"/>
                   </a:solidFill>
@@ -19543,7 +19543,7 @@
             </a:ln>
             <a:extLst>
               <a:ext uri="{91240B29-F687-4f45-9708-019B960494DF}">
-                <a14:hiddenLine xmlns:a14="http://schemas.microsoft.com/office/drawing/2010/main" xmlns:p14="http://schemas.microsoft.com/office/powerpoint/2010/main" xmlns:a16="http://schemas.microsoft.com/office/drawing/2014/main" xmlns="" w="9525">
+                <a14:hiddenLine xmlns="" xmlns:a16="http://schemas.microsoft.com/office/drawing/2014/main" xmlns:p14="http://schemas.microsoft.com/office/powerpoint/2010/main" xmlns:a14="http://schemas.microsoft.com/office/drawing/2010/main" w="9525">
                   <a:solidFill>
                     <a:srgbClr val="000000"/>
                   </a:solidFill>
@@ -19620,7 +19620,7 @@
             </a:ln>
             <a:extLst>
               <a:ext uri="{91240B29-F687-4f45-9708-019B960494DF}">
-                <a14:hiddenLine xmlns:a14="http://schemas.microsoft.com/office/drawing/2010/main" xmlns:p14="http://schemas.microsoft.com/office/powerpoint/2010/main" xmlns:a16="http://schemas.microsoft.com/office/drawing/2014/main" xmlns="" w="9525">
+                <a14:hiddenLine xmlns="" xmlns:a16="http://schemas.microsoft.com/office/drawing/2014/main" xmlns:p14="http://schemas.microsoft.com/office/powerpoint/2010/main" xmlns:a14="http://schemas.microsoft.com/office/drawing/2010/main" w="9525">
                   <a:solidFill>
                     <a:srgbClr val="000000"/>
                   </a:solidFill>
@@ -19725,7 +19725,7 @@
             </a:ln>
             <a:extLst>
               <a:ext uri="{91240B29-F687-4f45-9708-019B960494DF}">
-                <a14:hiddenLine xmlns:a14="http://schemas.microsoft.com/office/drawing/2010/main" xmlns:p14="http://schemas.microsoft.com/office/powerpoint/2010/main" xmlns:a16="http://schemas.microsoft.com/office/drawing/2014/main" xmlns="" w="9525">
+                <a14:hiddenLine xmlns="" xmlns:a16="http://schemas.microsoft.com/office/drawing/2014/main" xmlns:p14="http://schemas.microsoft.com/office/powerpoint/2010/main" xmlns:a14="http://schemas.microsoft.com/office/drawing/2010/main" w="9525">
                   <a:solidFill>
                     <a:srgbClr val="000000"/>
                   </a:solidFill>
@@ -19802,7 +19802,7 @@
             </a:ln>
             <a:extLst>
               <a:ext uri="{91240B29-F687-4f45-9708-019B960494DF}">
-                <a14:hiddenLine xmlns:a14="http://schemas.microsoft.com/office/drawing/2010/main" xmlns:p14="http://schemas.microsoft.com/office/powerpoint/2010/main" xmlns:a16="http://schemas.microsoft.com/office/drawing/2014/main" xmlns="" w="9525">
+                <a14:hiddenLine xmlns="" xmlns:a16="http://schemas.microsoft.com/office/drawing/2014/main" xmlns:p14="http://schemas.microsoft.com/office/powerpoint/2010/main" xmlns:a14="http://schemas.microsoft.com/office/drawing/2010/main" w="9525">
                   <a:solidFill>
                     <a:srgbClr val="000000"/>
                   </a:solidFill>
@@ -19879,7 +19879,7 @@
             </a:ln>
             <a:extLst>
               <a:ext uri="{91240B29-F687-4f45-9708-019B960494DF}">
-                <a14:hiddenLine xmlns:a14="http://schemas.microsoft.com/office/drawing/2010/main" xmlns:p14="http://schemas.microsoft.com/office/powerpoint/2010/main" xmlns:a16="http://schemas.microsoft.com/office/drawing/2014/main" xmlns="" w="9525">
+                <a14:hiddenLine xmlns="" xmlns:a16="http://schemas.microsoft.com/office/drawing/2014/main" xmlns:p14="http://schemas.microsoft.com/office/powerpoint/2010/main" xmlns:a14="http://schemas.microsoft.com/office/drawing/2010/main" w="9525">
                   <a:solidFill>
                     <a:srgbClr val="000000"/>
                   </a:solidFill>
@@ -19984,7 +19984,7 @@
             </a:ln>
             <a:extLst>
               <a:ext uri="{91240B29-F687-4f45-9708-019B960494DF}">
-                <a14:hiddenLine xmlns:a14="http://schemas.microsoft.com/office/drawing/2010/main" xmlns:p14="http://schemas.microsoft.com/office/powerpoint/2010/main" xmlns:a16="http://schemas.microsoft.com/office/drawing/2014/main" xmlns="" w="9525">
+                <a14:hiddenLine xmlns="" xmlns:a16="http://schemas.microsoft.com/office/drawing/2014/main" xmlns:p14="http://schemas.microsoft.com/office/powerpoint/2010/main" xmlns:a14="http://schemas.microsoft.com/office/drawing/2010/main" w="9525">
                   <a:solidFill>
                     <a:srgbClr val="000000"/>
                   </a:solidFill>
@@ -20089,7 +20089,7 @@
             </a:ln>
             <a:extLst>
               <a:ext uri="{91240B29-F687-4f45-9708-019B960494DF}">
-                <a14:hiddenLine xmlns:a14="http://schemas.microsoft.com/office/drawing/2010/main" xmlns:p14="http://schemas.microsoft.com/office/powerpoint/2010/main" xmlns:a16="http://schemas.microsoft.com/office/drawing/2014/main" xmlns="" w="9525">
+                <a14:hiddenLine xmlns="" xmlns:a16="http://schemas.microsoft.com/office/drawing/2014/main" xmlns:p14="http://schemas.microsoft.com/office/powerpoint/2010/main" xmlns:a14="http://schemas.microsoft.com/office/drawing/2010/main" w="9525">
                   <a:solidFill>
                     <a:srgbClr val="000000"/>
                   </a:solidFill>
@@ -20166,7 +20166,7 @@
             </a:ln>
             <a:extLst>
               <a:ext uri="{91240B29-F687-4f45-9708-019B960494DF}">
-                <a14:hiddenLine xmlns:a14="http://schemas.microsoft.com/office/drawing/2010/main" xmlns:p14="http://schemas.microsoft.com/office/powerpoint/2010/main" xmlns:a16="http://schemas.microsoft.com/office/drawing/2014/main" xmlns="" w="9525">
+                <a14:hiddenLine xmlns="" xmlns:a16="http://schemas.microsoft.com/office/drawing/2014/main" xmlns:p14="http://schemas.microsoft.com/office/powerpoint/2010/main" xmlns:a14="http://schemas.microsoft.com/office/drawing/2010/main" w="9525">
                   <a:solidFill>
                     <a:srgbClr val="000000"/>
                   </a:solidFill>
@@ -20291,7 +20291,7 @@
             </a:ln>
             <a:extLst>
               <a:ext uri="{91240B29-F687-4f45-9708-019B960494DF}">
-                <a14:hiddenLine xmlns:a14="http://schemas.microsoft.com/office/drawing/2010/main" xmlns:p14="http://schemas.microsoft.com/office/powerpoint/2010/main" xmlns:a16="http://schemas.microsoft.com/office/drawing/2014/main" xmlns="" w="9525">
+                <a14:hiddenLine xmlns="" xmlns:a16="http://schemas.microsoft.com/office/drawing/2014/main" xmlns:p14="http://schemas.microsoft.com/office/powerpoint/2010/main" xmlns:a14="http://schemas.microsoft.com/office/drawing/2010/main" w="9525">
                   <a:solidFill>
                     <a:srgbClr val="000000"/>
                   </a:solidFill>
@@ -20405,7 +20405,7 @@
             </a:ln>
             <a:extLst>
               <a:ext uri="{91240B29-F687-4f45-9708-019B960494DF}">
-                <a14:hiddenLine xmlns:a14="http://schemas.microsoft.com/office/drawing/2010/main" xmlns:p14="http://schemas.microsoft.com/office/powerpoint/2010/main" xmlns:a16="http://schemas.microsoft.com/office/drawing/2014/main" xmlns="" w="9525">
+                <a14:hiddenLine xmlns="" xmlns:a16="http://schemas.microsoft.com/office/drawing/2014/main" xmlns:p14="http://schemas.microsoft.com/office/powerpoint/2010/main" xmlns:a14="http://schemas.microsoft.com/office/drawing/2010/main" w="9525">
                   <a:solidFill>
                     <a:srgbClr val="000000"/>
                   </a:solidFill>
@@ -20482,7 +20482,7 @@
             </a:ln>
             <a:extLst>
               <a:ext uri="{91240B29-F687-4f45-9708-019B960494DF}">
-                <a14:hiddenLine xmlns:a14="http://schemas.microsoft.com/office/drawing/2010/main" xmlns:p14="http://schemas.microsoft.com/office/powerpoint/2010/main" xmlns:a16="http://schemas.microsoft.com/office/drawing/2014/main" xmlns="" w="9525">
+                <a14:hiddenLine xmlns="" xmlns:a16="http://schemas.microsoft.com/office/drawing/2014/main" xmlns:p14="http://schemas.microsoft.com/office/powerpoint/2010/main" xmlns:a14="http://schemas.microsoft.com/office/drawing/2010/main" w="9525">
                   <a:solidFill>
                     <a:srgbClr val="000000"/>
                   </a:solidFill>
@@ -20559,7 +20559,7 @@
             </a:ln>
             <a:extLst>
               <a:ext uri="{91240B29-F687-4f45-9708-019B960494DF}">
-                <a14:hiddenLine xmlns:a14="http://schemas.microsoft.com/office/drawing/2010/main" xmlns:p14="http://schemas.microsoft.com/office/powerpoint/2010/main" xmlns:a16="http://schemas.microsoft.com/office/drawing/2014/main" xmlns="" w="9525">
+                <a14:hiddenLine xmlns="" xmlns:a16="http://schemas.microsoft.com/office/drawing/2014/main" xmlns:p14="http://schemas.microsoft.com/office/powerpoint/2010/main" xmlns:a14="http://schemas.microsoft.com/office/drawing/2010/main" w="9525">
                   <a:solidFill>
                     <a:srgbClr val="000000"/>
                   </a:solidFill>
@@ -20664,7 +20664,7 @@
             </a:ln>
             <a:extLst>
               <a:ext uri="{91240B29-F687-4f45-9708-019B960494DF}">
-                <a14:hiddenLine xmlns:a14="http://schemas.microsoft.com/office/drawing/2010/main" xmlns:p14="http://schemas.microsoft.com/office/powerpoint/2010/main" xmlns:a16="http://schemas.microsoft.com/office/drawing/2014/main" xmlns="" w="9525">
+                <a14:hiddenLine xmlns="" xmlns:a16="http://schemas.microsoft.com/office/drawing/2014/main" xmlns:p14="http://schemas.microsoft.com/office/powerpoint/2010/main" xmlns:a14="http://schemas.microsoft.com/office/drawing/2010/main" w="9525">
                   <a:solidFill>
                     <a:srgbClr val="000000"/>
                   </a:solidFill>
@@ -20713,7 +20713,7 @@
             </a:ln>
             <a:extLst>
               <a:ext uri="{91240B29-F687-4f45-9708-019B960494DF}">
-                <a14:hiddenLine xmlns:a14="http://schemas.microsoft.com/office/drawing/2010/main" xmlns:p14="http://schemas.microsoft.com/office/powerpoint/2010/main" xmlns:a16="http://schemas.microsoft.com/office/drawing/2014/main" xmlns="" w="9525">
+                <a14:hiddenLine xmlns="" xmlns:a16="http://schemas.microsoft.com/office/drawing/2014/main" xmlns:p14="http://schemas.microsoft.com/office/powerpoint/2010/main" xmlns:a14="http://schemas.microsoft.com/office/drawing/2010/main" w="9525">
                   <a:solidFill>
                     <a:srgbClr val="000000"/>
                   </a:solidFill>
@@ -20793,7 +20793,7 @@
             </a:ln>
             <a:extLst>
               <a:ext uri="{91240B29-F687-4f45-9708-019B960494DF}">
-                <a14:hiddenLine xmlns:a14="http://schemas.microsoft.com/office/drawing/2010/main" xmlns:p14="http://schemas.microsoft.com/office/powerpoint/2010/main" xmlns:a16="http://schemas.microsoft.com/office/drawing/2014/main" xmlns="" w="9525">
+                <a14:hiddenLine xmlns="" xmlns:a16="http://schemas.microsoft.com/office/drawing/2014/main" xmlns:p14="http://schemas.microsoft.com/office/powerpoint/2010/main" xmlns:a14="http://schemas.microsoft.com/office/drawing/2010/main" w="9525">
                   <a:solidFill>
                     <a:srgbClr val="000000"/>
                   </a:solidFill>
@@ -20898,7 +20898,7 @@
             </a:ln>
             <a:extLst>
               <a:ext uri="{91240B29-F687-4f45-9708-019B960494DF}">
-                <a14:hiddenLine xmlns:a14="http://schemas.microsoft.com/office/drawing/2010/main" xmlns:p14="http://schemas.microsoft.com/office/powerpoint/2010/main" xmlns:a16="http://schemas.microsoft.com/office/drawing/2014/main" xmlns="" w="9525">
+                <a14:hiddenLine xmlns="" xmlns:a16="http://schemas.microsoft.com/office/drawing/2014/main" xmlns:p14="http://schemas.microsoft.com/office/powerpoint/2010/main" xmlns:a14="http://schemas.microsoft.com/office/drawing/2010/main" w="9525">
                   <a:solidFill>
                     <a:srgbClr val="000000"/>
                   </a:solidFill>
@@ -20975,7 +20975,7 @@
             </a:ln>
             <a:extLst>
               <a:ext uri="{91240B29-F687-4f45-9708-019B960494DF}">
-                <a14:hiddenLine xmlns:a14="http://schemas.microsoft.com/office/drawing/2010/main" xmlns:p14="http://schemas.microsoft.com/office/powerpoint/2010/main" xmlns:a16="http://schemas.microsoft.com/office/drawing/2014/main" xmlns="" w="9525">
+                <a14:hiddenLine xmlns="" xmlns:a16="http://schemas.microsoft.com/office/drawing/2014/main" xmlns:p14="http://schemas.microsoft.com/office/powerpoint/2010/main" xmlns:a14="http://schemas.microsoft.com/office/drawing/2010/main" w="9525">
                   <a:solidFill>
                     <a:srgbClr val="000000"/>
                   </a:solidFill>
@@ -21080,7 +21080,7 @@
             </a:ln>
             <a:extLst>
               <a:ext uri="{91240B29-F687-4f45-9708-019B960494DF}">
-                <a14:hiddenLine xmlns:a14="http://schemas.microsoft.com/office/drawing/2010/main" xmlns:p14="http://schemas.microsoft.com/office/powerpoint/2010/main" xmlns:a16="http://schemas.microsoft.com/office/drawing/2014/main" xmlns="" w="9525">
+                <a14:hiddenLine xmlns="" xmlns:a16="http://schemas.microsoft.com/office/drawing/2014/main" xmlns:p14="http://schemas.microsoft.com/office/powerpoint/2010/main" xmlns:a14="http://schemas.microsoft.com/office/drawing/2010/main" w="9525">
                   <a:solidFill>
                     <a:srgbClr val="000000"/>
                   </a:solidFill>
@@ -21160,7 +21160,7 @@
             </a:ln>
             <a:extLst>
               <a:ext uri="{91240B29-F687-4f45-9708-019B960494DF}">
-                <a14:hiddenLine xmlns:a14="http://schemas.microsoft.com/office/drawing/2010/main" xmlns:p14="http://schemas.microsoft.com/office/powerpoint/2010/main" xmlns:a16="http://schemas.microsoft.com/office/drawing/2014/main" xmlns="" w="9525">
+                <a14:hiddenLine xmlns="" xmlns:a16="http://schemas.microsoft.com/office/drawing/2014/main" xmlns:p14="http://schemas.microsoft.com/office/powerpoint/2010/main" xmlns:a14="http://schemas.microsoft.com/office/drawing/2010/main" w="9525">
                   <a:solidFill>
                     <a:srgbClr val="000000"/>
                   </a:solidFill>
@@ -21237,7 +21237,7 @@
             </a:ln>
             <a:extLst>
               <a:ext uri="{91240B29-F687-4f45-9708-019B960494DF}">
-                <a14:hiddenLine xmlns:a14="http://schemas.microsoft.com/office/drawing/2010/main" xmlns:p14="http://schemas.microsoft.com/office/powerpoint/2010/main" xmlns:a16="http://schemas.microsoft.com/office/drawing/2014/main" xmlns="" w="9525">
+                <a14:hiddenLine xmlns="" xmlns:a16="http://schemas.microsoft.com/office/drawing/2014/main" xmlns:p14="http://schemas.microsoft.com/office/powerpoint/2010/main" xmlns:a14="http://schemas.microsoft.com/office/drawing/2010/main" w="9525">
                   <a:solidFill>
                     <a:srgbClr val="000000"/>
                   </a:solidFill>
@@ -21342,7 +21342,7 @@
             </a:ln>
             <a:extLst>
               <a:ext uri="{91240B29-F687-4f45-9708-019B960494DF}">
-                <a14:hiddenLine xmlns:a14="http://schemas.microsoft.com/office/drawing/2010/main" xmlns:p14="http://schemas.microsoft.com/office/powerpoint/2010/main" xmlns:a16="http://schemas.microsoft.com/office/drawing/2014/main" xmlns="" w="9525">
+                <a14:hiddenLine xmlns="" xmlns:a16="http://schemas.microsoft.com/office/drawing/2014/main" xmlns:p14="http://schemas.microsoft.com/office/powerpoint/2010/main" xmlns:a14="http://schemas.microsoft.com/office/drawing/2010/main" w="9525">
                   <a:solidFill>
                     <a:srgbClr val="000000"/>
                   </a:solidFill>
@@ -21447,7 +21447,7 @@
             </a:ln>
             <a:extLst>
               <a:ext uri="{91240B29-F687-4f45-9708-019B960494DF}">
-                <a14:hiddenLine xmlns:a14="http://schemas.microsoft.com/office/drawing/2010/main" xmlns:p14="http://schemas.microsoft.com/office/powerpoint/2010/main" xmlns:a16="http://schemas.microsoft.com/office/drawing/2014/main" xmlns="" w="9525">
+                <a14:hiddenLine xmlns="" xmlns:a16="http://schemas.microsoft.com/office/drawing/2014/main" xmlns:p14="http://schemas.microsoft.com/office/powerpoint/2010/main" xmlns:a14="http://schemas.microsoft.com/office/drawing/2010/main" w="9525">
                   <a:solidFill>
                     <a:srgbClr val="000000"/>
                   </a:solidFill>
@@ -21527,7 +21527,7 @@
             </a:ln>
             <a:extLst>
               <a:ext uri="{91240B29-F687-4f45-9708-019B960494DF}">
-                <a14:hiddenLine xmlns:a14="http://schemas.microsoft.com/office/drawing/2010/main" xmlns:p14="http://schemas.microsoft.com/office/powerpoint/2010/main" xmlns:a16="http://schemas.microsoft.com/office/drawing/2014/main" xmlns="" w="9525">
+                <a14:hiddenLine xmlns="" xmlns:a16="http://schemas.microsoft.com/office/drawing/2014/main" xmlns:p14="http://schemas.microsoft.com/office/powerpoint/2010/main" xmlns:a14="http://schemas.microsoft.com/office/drawing/2010/main" w="9525">
                   <a:solidFill>
                     <a:srgbClr val="000000"/>
                   </a:solidFill>
@@ -21662,7 +21662,7 @@
             </a:ln>
             <a:extLst>
               <a:ext uri="{91240B29-F687-4f45-9708-019B960494DF}">
-                <a14:hiddenLine xmlns:a14="http://schemas.microsoft.com/office/drawing/2010/main" xmlns:p14="http://schemas.microsoft.com/office/powerpoint/2010/main" xmlns:a16="http://schemas.microsoft.com/office/drawing/2014/main" xmlns="" w="9525">
+                <a14:hiddenLine xmlns="" xmlns:a16="http://schemas.microsoft.com/office/drawing/2014/main" xmlns:p14="http://schemas.microsoft.com/office/powerpoint/2010/main" xmlns:a14="http://schemas.microsoft.com/office/drawing/2010/main" w="9525">
                   <a:solidFill>
                     <a:srgbClr val="000000"/>
                   </a:solidFill>
@@ -21747,15 +21747,7 @@
           <a:p>
             <a:r>
               <a:rPr lang="en-US" dirty="0"/>
-              <a:t>We have seen some techniques for </a:t>
-            </a:r>
-            <a:r>
-              <a:rPr lang="en-US" dirty="0" err="1"/>
-              <a:t>analysing</a:t>
-            </a:r>
-            <a:r>
-              <a:rPr lang="en-US" dirty="0"/>
-              <a:t> use cases and requirements, notably the noun-verb analysis . . . </a:t>
+              <a:t>We have seen some techniques for analyzing use cases and requirements, notably the noun-verb analysis . . . </a:t>
             </a:r>
           </a:p>
           <a:p>
@@ -21879,7 +21871,7 @@
             </a:ln>
             <a:extLst>
               <a:ext uri="{91240B29-F687-4f45-9708-019B960494DF}">
-                <a14:hiddenLine xmlns:a14="http://schemas.microsoft.com/office/drawing/2010/main" xmlns:p14="http://schemas.microsoft.com/office/powerpoint/2010/main" xmlns:a16="http://schemas.microsoft.com/office/drawing/2014/main" xmlns="" w="9525">
+                <a14:hiddenLine xmlns="" xmlns:a16="http://schemas.microsoft.com/office/drawing/2014/main" xmlns:p14="http://schemas.microsoft.com/office/powerpoint/2010/main" xmlns:a14="http://schemas.microsoft.com/office/drawing/2010/main" w="9525">
                   <a:solidFill>
                     <a:srgbClr val="000000"/>
                   </a:solidFill>
@@ -22009,7 +22001,7 @@
             </a:ln>
             <a:extLst>
               <a:ext uri="{91240B29-F687-4f45-9708-019B960494DF}">
-                <a14:hiddenLine xmlns:a14="http://schemas.microsoft.com/office/drawing/2010/main" xmlns:p14="http://schemas.microsoft.com/office/powerpoint/2010/main" xmlns:a16="http://schemas.microsoft.com/office/drawing/2014/main" xmlns="" w="9525">
+                <a14:hiddenLine xmlns="" xmlns:a16="http://schemas.microsoft.com/office/drawing/2014/main" xmlns:p14="http://schemas.microsoft.com/office/powerpoint/2010/main" xmlns:a14="http://schemas.microsoft.com/office/drawing/2010/main" w="9525">
                   <a:solidFill>
                     <a:srgbClr val="000000"/>
                   </a:solidFill>
@@ -22114,7 +22106,7 @@
             </a:ln>
             <a:extLst>
               <a:ext uri="{91240B29-F687-4f45-9708-019B960494DF}">
-                <a14:hiddenLine xmlns:a14="http://schemas.microsoft.com/office/drawing/2010/main" xmlns:p14="http://schemas.microsoft.com/office/powerpoint/2010/main" xmlns:a16="http://schemas.microsoft.com/office/drawing/2014/main" xmlns="" w="9525">
+                <a14:hiddenLine xmlns="" xmlns:a16="http://schemas.microsoft.com/office/drawing/2014/main" xmlns:p14="http://schemas.microsoft.com/office/powerpoint/2010/main" xmlns:a14="http://schemas.microsoft.com/office/drawing/2010/main" w="9525">
                   <a:solidFill>
                     <a:srgbClr val="000000"/>
                   </a:solidFill>
@@ -22194,7 +22186,7 @@
             </a:ln>
             <a:extLst>
               <a:ext uri="{91240B29-F687-4f45-9708-019B960494DF}">
-                <a14:hiddenLine xmlns:a14="http://schemas.microsoft.com/office/drawing/2010/main" xmlns:p14="http://schemas.microsoft.com/office/powerpoint/2010/main" xmlns:a16="http://schemas.microsoft.com/office/drawing/2014/main" xmlns="" w="9525">
+                <a14:hiddenLine xmlns="" xmlns:a16="http://schemas.microsoft.com/office/drawing/2014/main" xmlns:p14="http://schemas.microsoft.com/office/powerpoint/2010/main" xmlns:a14="http://schemas.microsoft.com/office/drawing/2010/main" w="9525">
                   <a:solidFill>
                     <a:srgbClr val="000000"/>
                   </a:solidFill>
@@ -22299,7 +22291,7 @@
             </a:ln>
             <a:extLst>
               <a:ext uri="{91240B29-F687-4f45-9708-019B960494DF}">
-                <a14:hiddenLine xmlns:a14="http://schemas.microsoft.com/office/drawing/2010/main" xmlns:p14="http://schemas.microsoft.com/office/powerpoint/2010/main" xmlns:a16="http://schemas.microsoft.com/office/drawing/2014/main" xmlns="" w="9525">
+                <a14:hiddenLine xmlns="" xmlns:a16="http://schemas.microsoft.com/office/drawing/2014/main" xmlns:p14="http://schemas.microsoft.com/office/powerpoint/2010/main" xmlns:a14="http://schemas.microsoft.com/office/drawing/2010/main" w="9525">
                   <a:solidFill>
                     <a:srgbClr val="000000"/>
                   </a:solidFill>
@@ -22382,7 +22374,7 @@
             </a:ln>
             <a:extLst>
               <a:ext uri="{91240B29-F687-4f45-9708-019B960494DF}">
-                <a14:hiddenLine xmlns:a14="http://schemas.microsoft.com/office/drawing/2010/main" xmlns:p14="http://schemas.microsoft.com/office/powerpoint/2010/main" xmlns:a16="http://schemas.microsoft.com/office/drawing/2014/main" xmlns="" w="9525">
+                <a14:hiddenLine xmlns="" xmlns:a16="http://schemas.microsoft.com/office/drawing/2014/main" xmlns:p14="http://schemas.microsoft.com/office/powerpoint/2010/main" xmlns:a14="http://schemas.microsoft.com/office/drawing/2010/main" w="9525">
                   <a:solidFill>
                     <a:srgbClr val="000000"/>
                   </a:solidFill>
@@ -22487,7 +22479,7 @@
             </a:ln>
             <a:extLst>
               <a:ext uri="{91240B29-F687-4f45-9708-019B960494DF}">
-                <a14:hiddenLine xmlns:a14="http://schemas.microsoft.com/office/drawing/2010/main" xmlns:p14="http://schemas.microsoft.com/office/powerpoint/2010/main" xmlns:a16="http://schemas.microsoft.com/office/drawing/2014/main" xmlns="" w="9525">
+                <a14:hiddenLine xmlns="" xmlns:a16="http://schemas.microsoft.com/office/drawing/2014/main" xmlns:p14="http://schemas.microsoft.com/office/powerpoint/2010/main" xmlns:a14="http://schemas.microsoft.com/office/drawing/2010/main" w="9525">
                   <a:solidFill>
                     <a:srgbClr val="000000"/>
                   </a:solidFill>
@@ -22570,7 +22562,7 @@
             </a:ln>
             <a:extLst>
               <a:ext uri="{91240B29-F687-4f45-9708-019B960494DF}">
-                <a14:hiddenLine xmlns:a14="http://schemas.microsoft.com/office/drawing/2010/main" xmlns:p14="http://schemas.microsoft.com/office/powerpoint/2010/main" xmlns:a16="http://schemas.microsoft.com/office/drawing/2014/main" xmlns="" w="9525">
+                <a14:hiddenLine xmlns="" xmlns:a16="http://schemas.microsoft.com/office/drawing/2014/main" xmlns:p14="http://schemas.microsoft.com/office/powerpoint/2010/main" xmlns:a14="http://schemas.microsoft.com/office/drawing/2010/main" w="9525">
                   <a:solidFill>
                     <a:srgbClr val="000000"/>
                   </a:solidFill>
@@ -22675,7 +22667,7 @@
             </a:ln>
             <a:extLst>
               <a:ext uri="{91240B29-F687-4f45-9708-019B960494DF}">
-                <a14:hiddenLine xmlns:a14="http://schemas.microsoft.com/office/drawing/2010/main" xmlns:p14="http://schemas.microsoft.com/office/powerpoint/2010/main" xmlns:a16="http://schemas.microsoft.com/office/drawing/2014/main" xmlns="" w="9525">
+                <a14:hiddenLine xmlns="" xmlns:a16="http://schemas.microsoft.com/office/drawing/2014/main" xmlns:p14="http://schemas.microsoft.com/office/powerpoint/2010/main" xmlns:a14="http://schemas.microsoft.com/office/drawing/2010/main" w="9525">
                   <a:solidFill>
                     <a:srgbClr val="000000"/>
                   </a:solidFill>
@@ -22724,7 +22716,7 @@
             </a:ln>
             <a:extLst>
               <a:ext uri="{91240B29-F687-4f45-9708-019B960494DF}">
-                <a14:hiddenLine xmlns:a14="http://schemas.microsoft.com/office/drawing/2010/main" xmlns:p14="http://schemas.microsoft.com/office/powerpoint/2010/main" xmlns:a16="http://schemas.microsoft.com/office/drawing/2014/main" xmlns="" w="9525">
+                <a14:hiddenLine xmlns="" xmlns:a16="http://schemas.microsoft.com/office/drawing/2014/main" xmlns:p14="http://schemas.microsoft.com/office/powerpoint/2010/main" xmlns:a14="http://schemas.microsoft.com/office/drawing/2010/main" w="9525">
                   <a:solidFill>
                     <a:srgbClr val="000000"/>
                   </a:solidFill>
@@ -23821,7 +23813,7 @@
           <a:noFill/>
           <a:extLst>
             <a:ext uri="{909E8E84-426E-40dd-AFC4-6F175D3DCCD1}">
-              <a14:hiddenFill xmlns="" xmlns:a16="http://schemas.microsoft.com/office/drawing/2014/main" xmlns:a14="http://schemas.microsoft.com/office/drawing/2010/main" xmlns:p14="http://schemas.microsoft.com/office/powerpoint/2010/main">
+              <a14:hiddenFill xmlns:p14="http://schemas.microsoft.com/office/powerpoint/2010/main" xmlns:a14="http://schemas.microsoft.com/office/drawing/2010/main" xmlns:a16="http://schemas.microsoft.com/office/drawing/2014/main" xmlns="">
                 <a:solidFill>
                   <a:srgbClr val="FFFFFF"/>
                 </a:solidFill>
@@ -23912,7 +23904,7 @@
             </a:ln>
             <a:extLst>
               <a:ext uri="{91240B29-F687-4f45-9708-019B960494DF}">
-                <a14:hiddenLine xmlns="" xmlns:a16="http://schemas.microsoft.com/office/drawing/2014/main" xmlns:a14="http://schemas.microsoft.com/office/drawing/2010/main" xmlns:p14="http://schemas.microsoft.com/office/powerpoint/2010/main" w="9525">
+                <a14:hiddenLine xmlns:p14="http://schemas.microsoft.com/office/powerpoint/2010/main" xmlns:a14="http://schemas.microsoft.com/office/drawing/2010/main" xmlns:a16="http://schemas.microsoft.com/office/drawing/2014/main" xmlns="" w="9525">
                   <a:solidFill>
                     <a:srgbClr val="000000"/>
                   </a:solidFill>
@@ -24017,7 +24009,7 @@
             </a:ln>
             <a:extLst>
               <a:ext uri="{91240B29-F687-4f45-9708-019B960494DF}">
-                <a14:hiddenLine xmlns="" xmlns:a16="http://schemas.microsoft.com/office/drawing/2014/main" xmlns:a14="http://schemas.microsoft.com/office/drawing/2010/main" xmlns:p14="http://schemas.microsoft.com/office/powerpoint/2010/main" w="9525">
+                <a14:hiddenLine xmlns:p14="http://schemas.microsoft.com/office/powerpoint/2010/main" xmlns:a14="http://schemas.microsoft.com/office/drawing/2010/main" xmlns:a16="http://schemas.microsoft.com/office/drawing/2014/main" xmlns="" w="9525">
                   <a:solidFill>
                     <a:srgbClr val="000000"/>
                   </a:solidFill>
@@ -24122,7 +24114,7 @@
             </a:ln>
             <a:extLst>
               <a:ext uri="{91240B29-F687-4f45-9708-019B960494DF}">
-                <a14:hiddenLine xmlns="" xmlns:a16="http://schemas.microsoft.com/office/drawing/2014/main" xmlns:a14="http://schemas.microsoft.com/office/drawing/2010/main" xmlns:p14="http://schemas.microsoft.com/office/powerpoint/2010/main" w="9525">
+                <a14:hiddenLine xmlns:p14="http://schemas.microsoft.com/office/powerpoint/2010/main" xmlns:a14="http://schemas.microsoft.com/office/drawing/2010/main" xmlns:a16="http://schemas.microsoft.com/office/drawing/2014/main" xmlns="" w="9525">
                   <a:solidFill>
                     <a:srgbClr val="000000"/>
                   </a:solidFill>
@@ -24171,7 +24163,7 @@
             </a:ln>
             <a:extLst>
               <a:ext uri="{91240B29-F687-4f45-9708-019B960494DF}">
-                <a14:hiddenLine xmlns="" xmlns:a16="http://schemas.microsoft.com/office/drawing/2014/main" xmlns:a14="http://schemas.microsoft.com/office/drawing/2010/main" xmlns:p14="http://schemas.microsoft.com/office/powerpoint/2010/main" w="9525">
+                <a14:hiddenLine xmlns:p14="http://schemas.microsoft.com/office/powerpoint/2010/main" xmlns:a14="http://schemas.microsoft.com/office/drawing/2010/main" xmlns:a16="http://schemas.microsoft.com/office/drawing/2014/main" xmlns="" w="9525">
                   <a:solidFill>
                     <a:srgbClr val="000000"/>
                   </a:solidFill>
@@ -24276,7 +24268,7 @@
             </a:ln>
             <a:extLst>
               <a:ext uri="{91240B29-F687-4f45-9708-019B960494DF}">
-                <a14:hiddenLine xmlns="" xmlns:a16="http://schemas.microsoft.com/office/drawing/2014/main" xmlns:a14="http://schemas.microsoft.com/office/drawing/2010/main" xmlns:p14="http://schemas.microsoft.com/office/powerpoint/2010/main" w="9525">
+                <a14:hiddenLine xmlns:p14="http://schemas.microsoft.com/office/powerpoint/2010/main" xmlns:a14="http://schemas.microsoft.com/office/drawing/2010/main" xmlns:a16="http://schemas.microsoft.com/office/drawing/2014/main" xmlns="" w="9525">
                   <a:solidFill>
                     <a:srgbClr val="000000"/>
                   </a:solidFill>
@@ -24353,7 +24345,7 @@
             </a:ln>
             <a:extLst>
               <a:ext uri="{91240B29-F687-4f45-9708-019B960494DF}">
-                <a14:hiddenLine xmlns="" xmlns:a16="http://schemas.microsoft.com/office/drawing/2014/main" xmlns:a14="http://schemas.microsoft.com/office/drawing/2010/main" xmlns:p14="http://schemas.microsoft.com/office/powerpoint/2010/main" w="9525">
+                <a14:hiddenLine xmlns:p14="http://schemas.microsoft.com/office/powerpoint/2010/main" xmlns:a14="http://schemas.microsoft.com/office/drawing/2010/main" xmlns:a16="http://schemas.microsoft.com/office/drawing/2014/main" xmlns="" w="9525">
                   <a:solidFill>
                     <a:srgbClr val="000000"/>
                   </a:solidFill>
@@ -24430,7 +24422,7 @@
             </a:ln>
             <a:extLst>
               <a:ext uri="{91240B29-F687-4f45-9708-019B960494DF}">
-                <a14:hiddenLine xmlns="" xmlns:a16="http://schemas.microsoft.com/office/drawing/2014/main" xmlns:a14="http://schemas.microsoft.com/office/drawing/2010/main" xmlns:p14="http://schemas.microsoft.com/office/powerpoint/2010/main" w="9525">
+                <a14:hiddenLine xmlns:p14="http://schemas.microsoft.com/office/powerpoint/2010/main" xmlns:a14="http://schemas.microsoft.com/office/drawing/2010/main" xmlns:a16="http://schemas.microsoft.com/office/drawing/2014/main" xmlns="" w="9525">
                   <a:solidFill>
                     <a:srgbClr val="000000"/>
                   </a:solidFill>
@@ -24535,7 +24527,7 @@
             </a:ln>
             <a:extLst>
               <a:ext uri="{91240B29-F687-4f45-9708-019B960494DF}">
-                <a14:hiddenLine xmlns="" xmlns:a16="http://schemas.microsoft.com/office/drawing/2014/main" xmlns:a14="http://schemas.microsoft.com/office/drawing/2010/main" xmlns:p14="http://schemas.microsoft.com/office/powerpoint/2010/main" w="9525">
+                <a14:hiddenLine xmlns:p14="http://schemas.microsoft.com/office/powerpoint/2010/main" xmlns:a14="http://schemas.microsoft.com/office/drawing/2010/main" xmlns:a16="http://schemas.microsoft.com/office/drawing/2014/main" xmlns="" w="9525">
                   <a:solidFill>
                     <a:srgbClr val="000000"/>
                   </a:solidFill>
@@ -24612,7 +24604,7 @@
             </a:ln>
             <a:extLst>
               <a:ext uri="{91240B29-F687-4f45-9708-019B960494DF}">
-                <a14:hiddenLine xmlns="" xmlns:a16="http://schemas.microsoft.com/office/drawing/2014/main" xmlns:a14="http://schemas.microsoft.com/office/drawing/2010/main" xmlns:p14="http://schemas.microsoft.com/office/powerpoint/2010/main" w="9525">
+                <a14:hiddenLine xmlns:p14="http://schemas.microsoft.com/office/powerpoint/2010/main" xmlns:a14="http://schemas.microsoft.com/office/drawing/2010/main" xmlns:a16="http://schemas.microsoft.com/office/drawing/2014/main" xmlns="" w="9525">
                   <a:solidFill>
                     <a:srgbClr val="000000"/>
                   </a:solidFill>
@@ -24689,7 +24681,7 @@
             </a:ln>
             <a:extLst>
               <a:ext uri="{91240B29-F687-4f45-9708-019B960494DF}">
-                <a14:hiddenLine xmlns="" xmlns:a16="http://schemas.microsoft.com/office/drawing/2014/main" xmlns:a14="http://schemas.microsoft.com/office/drawing/2010/main" xmlns:p14="http://schemas.microsoft.com/office/powerpoint/2010/main" w="9525">
+                <a14:hiddenLine xmlns:p14="http://schemas.microsoft.com/office/powerpoint/2010/main" xmlns:a14="http://schemas.microsoft.com/office/drawing/2010/main" xmlns:a16="http://schemas.microsoft.com/office/drawing/2014/main" xmlns="" w="9525">
                   <a:solidFill>
                     <a:srgbClr val="000000"/>
                   </a:solidFill>
@@ -24794,7 +24786,7 @@
             </a:ln>
             <a:extLst>
               <a:ext uri="{91240B29-F687-4f45-9708-019B960494DF}">
-                <a14:hiddenLine xmlns="" xmlns:a16="http://schemas.microsoft.com/office/drawing/2014/main" xmlns:a14="http://schemas.microsoft.com/office/drawing/2010/main" xmlns:p14="http://schemas.microsoft.com/office/powerpoint/2010/main" w="9525">
+                <a14:hiddenLine xmlns:p14="http://schemas.microsoft.com/office/powerpoint/2010/main" xmlns:a14="http://schemas.microsoft.com/office/drawing/2010/main" xmlns:a16="http://schemas.microsoft.com/office/drawing/2014/main" xmlns="" w="9525">
                   <a:solidFill>
                     <a:srgbClr val="000000"/>
                   </a:solidFill>
@@ -24899,7 +24891,7 @@
             </a:ln>
             <a:extLst>
               <a:ext uri="{91240B29-F687-4f45-9708-019B960494DF}">
-                <a14:hiddenLine xmlns="" xmlns:a16="http://schemas.microsoft.com/office/drawing/2014/main" xmlns:a14="http://schemas.microsoft.com/office/drawing/2010/main" xmlns:p14="http://schemas.microsoft.com/office/powerpoint/2010/main" w="9525">
+                <a14:hiddenLine xmlns:p14="http://schemas.microsoft.com/office/powerpoint/2010/main" xmlns:a14="http://schemas.microsoft.com/office/drawing/2010/main" xmlns:a16="http://schemas.microsoft.com/office/drawing/2014/main" xmlns="" w="9525">
                   <a:solidFill>
                     <a:srgbClr val="000000"/>
                   </a:solidFill>
@@ -24976,7 +24968,7 @@
             </a:ln>
             <a:extLst>
               <a:ext uri="{91240B29-F687-4f45-9708-019B960494DF}">
-                <a14:hiddenLine xmlns="" xmlns:a16="http://schemas.microsoft.com/office/drawing/2014/main" xmlns:a14="http://schemas.microsoft.com/office/drawing/2010/main" xmlns:p14="http://schemas.microsoft.com/office/powerpoint/2010/main" w="9525">
+                <a14:hiddenLine xmlns:p14="http://schemas.microsoft.com/office/powerpoint/2010/main" xmlns:a14="http://schemas.microsoft.com/office/drawing/2010/main" xmlns:a16="http://schemas.microsoft.com/office/drawing/2014/main" xmlns="" w="9525">
                   <a:solidFill>
                     <a:srgbClr val="000000"/>
                   </a:solidFill>
@@ -25101,7 +25093,7 @@
             </a:ln>
             <a:extLst>
               <a:ext uri="{91240B29-F687-4f45-9708-019B960494DF}">
-                <a14:hiddenLine xmlns="" xmlns:a16="http://schemas.microsoft.com/office/drawing/2014/main" xmlns:a14="http://schemas.microsoft.com/office/drawing/2010/main" xmlns:p14="http://schemas.microsoft.com/office/powerpoint/2010/main" w="9525">
+                <a14:hiddenLine xmlns:p14="http://schemas.microsoft.com/office/powerpoint/2010/main" xmlns:a14="http://schemas.microsoft.com/office/drawing/2010/main" xmlns:a16="http://schemas.microsoft.com/office/drawing/2014/main" xmlns="" w="9525">
                   <a:solidFill>
                     <a:srgbClr val="000000"/>
                   </a:solidFill>
@@ -25178,7 +25170,7 @@
             </a:ln>
             <a:extLst>
               <a:ext uri="{91240B29-F687-4f45-9708-019B960494DF}">
-                <a14:hiddenLine xmlns="" xmlns:a16="http://schemas.microsoft.com/office/drawing/2014/main" xmlns:a14="http://schemas.microsoft.com/office/drawing/2010/main" xmlns:p14="http://schemas.microsoft.com/office/powerpoint/2010/main" w="9525">
+                <a14:hiddenLine xmlns:p14="http://schemas.microsoft.com/office/powerpoint/2010/main" xmlns:a14="http://schemas.microsoft.com/office/drawing/2010/main" xmlns:a16="http://schemas.microsoft.com/office/drawing/2014/main" xmlns="" w="9525">
                   <a:solidFill>
                     <a:srgbClr val="000000"/>
                   </a:solidFill>
@@ -25283,7 +25275,7 @@
             </a:ln>
             <a:extLst>
               <a:ext uri="{91240B29-F687-4f45-9708-019B960494DF}">
-                <a14:hiddenLine xmlns="" xmlns:a16="http://schemas.microsoft.com/office/drawing/2014/main" xmlns:a14="http://schemas.microsoft.com/office/drawing/2010/main" xmlns:p14="http://schemas.microsoft.com/office/powerpoint/2010/main" w="9525">
+                <a14:hiddenLine xmlns:p14="http://schemas.microsoft.com/office/powerpoint/2010/main" xmlns:a14="http://schemas.microsoft.com/office/drawing/2010/main" xmlns:a16="http://schemas.microsoft.com/office/drawing/2014/main" xmlns="" w="9525">
                   <a:solidFill>
                     <a:srgbClr val="000000"/>
                   </a:solidFill>
@@ -25388,7 +25380,7 @@
             </a:ln>
             <a:extLst>
               <a:ext uri="{91240B29-F687-4f45-9708-019B960494DF}">
-                <a14:hiddenLine xmlns="" xmlns:a16="http://schemas.microsoft.com/office/drawing/2014/main" xmlns:a14="http://schemas.microsoft.com/office/drawing/2010/main" xmlns:p14="http://schemas.microsoft.com/office/powerpoint/2010/main" w="9525">
+                <a14:hiddenLine xmlns:p14="http://schemas.microsoft.com/office/powerpoint/2010/main" xmlns:a14="http://schemas.microsoft.com/office/drawing/2010/main" xmlns:a16="http://schemas.microsoft.com/office/drawing/2014/main" xmlns="" w="9525">
                   <a:solidFill>
                     <a:srgbClr val="000000"/>
                   </a:solidFill>
@@ -25465,7 +25457,7 @@
             </a:ln>
             <a:extLst>
               <a:ext uri="{91240B29-F687-4f45-9708-019B960494DF}">
-                <a14:hiddenLine xmlns="" xmlns:a16="http://schemas.microsoft.com/office/drawing/2014/main" xmlns:a14="http://schemas.microsoft.com/office/drawing/2010/main" xmlns:p14="http://schemas.microsoft.com/office/powerpoint/2010/main" w="9525">
+                <a14:hiddenLine xmlns:p14="http://schemas.microsoft.com/office/powerpoint/2010/main" xmlns:a14="http://schemas.microsoft.com/office/drawing/2010/main" xmlns:a16="http://schemas.microsoft.com/office/drawing/2014/main" xmlns="" w="9525">
                   <a:solidFill>
                     <a:srgbClr val="000000"/>
                   </a:solidFill>
@@ -25570,7 +25562,7 @@
             </a:ln>
             <a:extLst>
               <a:ext uri="{91240B29-F687-4f45-9708-019B960494DF}">
-                <a14:hiddenLine xmlns="" xmlns:a16="http://schemas.microsoft.com/office/drawing/2014/main" xmlns:a14="http://schemas.microsoft.com/office/drawing/2010/main" xmlns:p14="http://schemas.microsoft.com/office/powerpoint/2010/main" w="9525">
+                <a14:hiddenLine xmlns:p14="http://schemas.microsoft.com/office/powerpoint/2010/main" xmlns:a14="http://schemas.microsoft.com/office/drawing/2010/main" xmlns:a16="http://schemas.microsoft.com/office/drawing/2014/main" xmlns="" w="9525">
                   <a:solidFill>
                     <a:srgbClr val="000000"/>
                   </a:solidFill>
@@ -25675,7 +25667,7 @@
             </a:ln>
             <a:extLst>
               <a:ext uri="{91240B29-F687-4f45-9708-019B960494DF}">
-                <a14:hiddenLine xmlns="" xmlns:a16="http://schemas.microsoft.com/office/drawing/2014/main" xmlns:a14="http://schemas.microsoft.com/office/drawing/2010/main" xmlns:p14="http://schemas.microsoft.com/office/powerpoint/2010/main" w="9525">
+                <a14:hiddenLine xmlns:p14="http://schemas.microsoft.com/office/powerpoint/2010/main" xmlns:a14="http://schemas.microsoft.com/office/drawing/2010/main" xmlns:a16="http://schemas.microsoft.com/office/drawing/2014/main" xmlns="" w="9525">
                   <a:solidFill>
                     <a:srgbClr val="000000"/>
                   </a:solidFill>
@@ -25746,7 +25738,7 @@
             </a:ln>
             <a:extLst>
               <a:ext uri="{91240B29-F687-4f45-9708-019B960494DF}">
-                <a14:hiddenLine xmlns="" xmlns:a16="http://schemas.microsoft.com/office/drawing/2014/main" xmlns:a14="http://schemas.microsoft.com/office/drawing/2010/main" xmlns:p14="http://schemas.microsoft.com/office/powerpoint/2010/main" w="9525">
+                <a14:hiddenLine xmlns:p14="http://schemas.microsoft.com/office/powerpoint/2010/main" xmlns:a14="http://schemas.microsoft.com/office/drawing/2010/main" xmlns:a16="http://schemas.microsoft.com/office/drawing/2014/main" xmlns="" w="9525">
                   <a:solidFill>
                     <a:srgbClr val="000000"/>
                   </a:solidFill>
@@ -25851,7 +25843,7 @@
             </a:ln>
             <a:extLst>
               <a:ext uri="{91240B29-F687-4f45-9708-019B960494DF}">
-                <a14:hiddenLine xmlns="" xmlns:a16="http://schemas.microsoft.com/office/drawing/2014/main" xmlns:a14="http://schemas.microsoft.com/office/drawing/2010/main" xmlns:p14="http://schemas.microsoft.com/office/powerpoint/2010/main" w="9525">
+                <a14:hiddenLine xmlns:p14="http://schemas.microsoft.com/office/powerpoint/2010/main" xmlns:a14="http://schemas.microsoft.com/office/drawing/2010/main" xmlns:a16="http://schemas.microsoft.com/office/drawing/2014/main" xmlns="" w="9525">
                   <a:solidFill>
                     <a:srgbClr val="000000"/>
                   </a:solidFill>
@@ -25922,7 +25914,7 @@
             </a:ln>
             <a:extLst>
               <a:ext uri="{91240B29-F687-4f45-9708-019B960494DF}">
-                <a14:hiddenLine xmlns="" xmlns:a16="http://schemas.microsoft.com/office/drawing/2014/main" xmlns:a14="http://schemas.microsoft.com/office/drawing/2010/main" xmlns:p14="http://schemas.microsoft.com/office/powerpoint/2010/main" w="9525">
+                <a14:hiddenLine xmlns:p14="http://schemas.microsoft.com/office/powerpoint/2010/main" xmlns:a14="http://schemas.microsoft.com/office/drawing/2010/main" xmlns:a16="http://schemas.microsoft.com/office/drawing/2014/main" xmlns="" w="9525">
                   <a:solidFill>
                     <a:srgbClr val="000000"/>
                   </a:solidFill>
@@ -26027,7 +26019,7 @@
             </a:ln>
             <a:extLst>
               <a:ext uri="{91240B29-F687-4f45-9708-019B960494DF}">
-                <a14:hiddenLine xmlns="" xmlns:a16="http://schemas.microsoft.com/office/drawing/2014/main" xmlns:a14="http://schemas.microsoft.com/office/drawing/2010/main" xmlns:p14="http://schemas.microsoft.com/office/powerpoint/2010/main" w="9525">
+                <a14:hiddenLine xmlns:p14="http://schemas.microsoft.com/office/powerpoint/2010/main" xmlns:a14="http://schemas.microsoft.com/office/drawing/2010/main" xmlns:a16="http://schemas.microsoft.com/office/drawing/2014/main" xmlns="" w="9525">
                   <a:solidFill>
                     <a:srgbClr val="000000"/>
                   </a:solidFill>
@@ -26110,7 +26102,7 @@
             </a:ln>
             <a:extLst>
               <a:ext uri="{91240B29-F687-4f45-9708-019B960494DF}">
-                <a14:hiddenLine xmlns="" xmlns:a16="http://schemas.microsoft.com/office/drawing/2014/main" xmlns:a14="http://schemas.microsoft.com/office/drawing/2010/main" xmlns:p14="http://schemas.microsoft.com/office/powerpoint/2010/main" w="9525">
+                <a14:hiddenLine xmlns:p14="http://schemas.microsoft.com/office/powerpoint/2010/main" xmlns:a14="http://schemas.microsoft.com/office/drawing/2010/main" xmlns:a16="http://schemas.microsoft.com/office/drawing/2014/main" xmlns="" w="9525">
                   <a:solidFill>
                     <a:srgbClr val="000000"/>
                   </a:solidFill>
@@ -26215,7 +26207,7 @@
             </a:ln>
             <a:extLst>
               <a:ext uri="{91240B29-F687-4f45-9708-019B960494DF}">
-                <a14:hiddenLine xmlns="" xmlns:a16="http://schemas.microsoft.com/office/drawing/2014/main" xmlns:a14="http://schemas.microsoft.com/office/drawing/2010/main" xmlns:p14="http://schemas.microsoft.com/office/powerpoint/2010/main" w="9525">
+                <a14:hiddenLine xmlns:p14="http://schemas.microsoft.com/office/powerpoint/2010/main" xmlns:a14="http://schemas.microsoft.com/office/drawing/2010/main" xmlns:a16="http://schemas.microsoft.com/office/drawing/2014/main" xmlns="" w="9525">
                   <a:solidFill>
                     <a:srgbClr val="000000"/>
                   </a:solidFill>
@@ -26298,7 +26290,7 @@
             </a:ln>
             <a:extLst>
               <a:ext uri="{91240B29-F687-4f45-9708-019B960494DF}">
-                <a14:hiddenLine xmlns="" xmlns:a16="http://schemas.microsoft.com/office/drawing/2014/main" xmlns:a14="http://schemas.microsoft.com/office/drawing/2010/main" xmlns:p14="http://schemas.microsoft.com/office/powerpoint/2010/main" w="9525">
+                <a14:hiddenLine xmlns:p14="http://schemas.microsoft.com/office/powerpoint/2010/main" xmlns:a14="http://schemas.microsoft.com/office/drawing/2010/main" xmlns:a16="http://schemas.microsoft.com/office/drawing/2014/main" xmlns="" w="9525">
                   <a:solidFill>
                     <a:srgbClr val="000000"/>
                   </a:solidFill>
@@ -26403,7 +26395,7 @@
             </a:ln>
             <a:extLst>
               <a:ext uri="{91240B29-F687-4f45-9708-019B960494DF}">
-                <a14:hiddenLine xmlns="" xmlns:a16="http://schemas.microsoft.com/office/drawing/2014/main" xmlns:a14="http://schemas.microsoft.com/office/drawing/2010/main" xmlns:p14="http://schemas.microsoft.com/office/powerpoint/2010/main" w="9525">
+                <a14:hiddenLine xmlns:p14="http://schemas.microsoft.com/office/powerpoint/2010/main" xmlns:a14="http://schemas.microsoft.com/office/drawing/2010/main" xmlns:a16="http://schemas.microsoft.com/office/drawing/2014/main" xmlns="" w="9525">
                   <a:solidFill>
                     <a:srgbClr val="000000"/>
                   </a:solidFill>
@@ -26452,7 +26444,7 @@
             </a:ln>
             <a:extLst>
               <a:ext uri="{91240B29-F687-4f45-9708-019B960494DF}">
-                <a14:hiddenLine xmlns="" xmlns:a16="http://schemas.microsoft.com/office/drawing/2014/main" xmlns:a14="http://schemas.microsoft.com/office/drawing/2010/main" xmlns:p14="http://schemas.microsoft.com/office/powerpoint/2010/main" w="9525">
+                <a14:hiddenLine xmlns:p14="http://schemas.microsoft.com/office/powerpoint/2010/main" xmlns:a14="http://schemas.microsoft.com/office/drawing/2010/main" xmlns:a16="http://schemas.microsoft.com/office/drawing/2014/main" xmlns="" w="9525">
                   <a:solidFill>
                     <a:srgbClr val="000000"/>
                   </a:solidFill>
@@ -26557,7 +26549,7 @@
             </a:ln>
             <a:extLst>
               <a:ext uri="{91240B29-F687-4f45-9708-019B960494DF}">
-                <a14:hiddenLine xmlns="" xmlns:a16="http://schemas.microsoft.com/office/drawing/2014/main" xmlns:a14="http://schemas.microsoft.com/office/drawing/2010/main" xmlns:p14="http://schemas.microsoft.com/office/powerpoint/2010/main" w="9525">
+                <a14:hiddenLine xmlns:p14="http://schemas.microsoft.com/office/powerpoint/2010/main" xmlns:a14="http://schemas.microsoft.com/office/drawing/2010/main" xmlns:a16="http://schemas.microsoft.com/office/drawing/2014/main" xmlns="" w="9525">
                   <a:solidFill>
                     <a:srgbClr val="000000"/>
                   </a:solidFill>
@@ -26634,7 +26626,7 @@
             </a:ln>
             <a:extLst>
               <a:ext uri="{91240B29-F687-4f45-9708-019B960494DF}">
-                <a14:hiddenLine xmlns="" xmlns:a16="http://schemas.microsoft.com/office/drawing/2014/main" xmlns:a14="http://schemas.microsoft.com/office/drawing/2010/main" xmlns:p14="http://schemas.microsoft.com/office/powerpoint/2010/main" w="9525">
+                <a14:hiddenLine xmlns:p14="http://schemas.microsoft.com/office/powerpoint/2010/main" xmlns:a14="http://schemas.microsoft.com/office/drawing/2010/main" xmlns:a16="http://schemas.microsoft.com/office/drawing/2014/main" xmlns="" w="9525">
                   <a:solidFill>
                     <a:srgbClr val="000000"/>
                   </a:solidFill>
@@ -26711,7 +26703,7 @@
             </a:ln>
             <a:extLst>
               <a:ext uri="{91240B29-F687-4f45-9708-019B960494DF}">
-                <a14:hiddenLine xmlns="" xmlns:a16="http://schemas.microsoft.com/office/drawing/2014/main" xmlns:a14="http://schemas.microsoft.com/office/drawing/2010/main" xmlns:p14="http://schemas.microsoft.com/office/powerpoint/2010/main" w="9525">
+                <a14:hiddenLine xmlns:p14="http://schemas.microsoft.com/office/powerpoint/2010/main" xmlns:a14="http://schemas.microsoft.com/office/drawing/2010/main" xmlns:a16="http://schemas.microsoft.com/office/drawing/2014/main" xmlns="" w="9525">
                   <a:solidFill>
                     <a:srgbClr val="000000"/>
                   </a:solidFill>
@@ -26816,7 +26808,7 @@
             </a:ln>
             <a:extLst>
               <a:ext uri="{91240B29-F687-4f45-9708-019B960494DF}">
-                <a14:hiddenLine xmlns="" xmlns:a16="http://schemas.microsoft.com/office/drawing/2014/main" xmlns:a14="http://schemas.microsoft.com/office/drawing/2010/main" xmlns:p14="http://schemas.microsoft.com/office/powerpoint/2010/main" w="9525">
+                <a14:hiddenLine xmlns:p14="http://schemas.microsoft.com/office/powerpoint/2010/main" xmlns:a14="http://schemas.microsoft.com/office/drawing/2010/main" xmlns:a16="http://schemas.microsoft.com/office/drawing/2014/main" xmlns="" w="9525">
                   <a:solidFill>
                     <a:srgbClr val="000000"/>
                   </a:solidFill>
@@ -26899,7 +26891,7 @@
             </a:ln>
             <a:extLst>
               <a:ext uri="{91240B29-F687-4f45-9708-019B960494DF}">
-                <a14:hiddenLine xmlns="" xmlns:a16="http://schemas.microsoft.com/office/drawing/2014/main" xmlns:a14="http://schemas.microsoft.com/office/drawing/2010/main" xmlns:p14="http://schemas.microsoft.com/office/powerpoint/2010/main" w="9525">
+                <a14:hiddenLine xmlns:p14="http://schemas.microsoft.com/office/powerpoint/2010/main" xmlns:a14="http://schemas.microsoft.com/office/drawing/2010/main" xmlns:a16="http://schemas.microsoft.com/office/drawing/2014/main" xmlns="" w="9525">
                   <a:solidFill>
                     <a:srgbClr val="000000"/>
                   </a:solidFill>
@@ -26976,7 +26968,7 @@
             </a:ln>
             <a:extLst>
               <a:ext uri="{91240B29-F687-4f45-9708-019B960494DF}">
-                <a14:hiddenLine xmlns="" xmlns:a16="http://schemas.microsoft.com/office/drawing/2014/main" xmlns:a14="http://schemas.microsoft.com/office/drawing/2010/main" xmlns:p14="http://schemas.microsoft.com/office/powerpoint/2010/main" w="9525">
+                <a14:hiddenLine xmlns:p14="http://schemas.microsoft.com/office/powerpoint/2010/main" xmlns:a14="http://schemas.microsoft.com/office/drawing/2010/main" xmlns:a16="http://schemas.microsoft.com/office/drawing/2014/main" xmlns="" w="9525">
                   <a:solidFill>
                     <a:srgbClr val="000000"/>
                   </a:solidFill>
@@ -27081,7 +27073,7 @@
             </a:ln>
             <a:extLst>
               <a:ext uri="{91240B29-F687-4f45-9708-019B960494DF}">
-                <a14:hiddenLine xmlns="" xmlns:a16="http://schemas.microsoft.com/office/drawing/2014/main" xmlns:a14="http://schemas.microsoft.com/office/drawing/2010/main" xmlns:p14="http://schemas.microsoft.com/office/powerpoint/2010/main" w="9525">
+                <a14:hiddenLine xmlns:p14="http://schemas.microsoft.com/office/powerpoint/2010/main" xmlns:a14="http://schemas.microsoft.com/office/drawing/2010/main" xmlns:a16="http://schemas.microsoft.com/office/drawing/2014/main" xmlns="" w="9525">
                   <a:solidFill>
                     <a:srgbClr val="000000"/>
                   </a:solidFill>
@@ -27158,7 +27150,7 @@
             </a:ln>
             <a:extLst>
               <a:ext uri="{91240B29-F687-4f45-9708-019B960494DF}">
-                <a14:hiddenLine xmlns="" xmlns:a16="http://schemas.microsoft.com/office/drawing/2014/main" xmlns:a14="http://schemas.microsoft.com/office/drawing/2010/main" xmlns:p14="http://schemas.microsoft.com/office/powerpoint/2010/main" w="9525">
+                <a14:hiddenLine xmlns:p14="http://schemas.microsoft.com/office/powerpoint/2010/main" xmlns:a14="http://schemas.microsoft.com/office/drawing/2010/main" xmlns:a16="http://schemas.microsoft.com/office/drawing/2014/main" xmlns="" w="9525">
                   <a:solidFill>
                     <a:srgbClr val="000000"/>
                   </a:solidFill>
@@ -27263,7 +27255,7 @@
             </a:ln>
             <a:extLst>
               <a:ext uri="{91240B29-F687-4f45-9708-019B960494DF}">
-                <a14:hiddenLine xmlns="" xmlns:a16="http://schemas.microsoft.com/office/drawing/2014/main" xmlns:a14="http://schemas.microsoft.com/office/drawing/2010/main" xmlns:p14="http://schemas.microsoft.com/office/powerpoint/2010/main" w="9525">
+                <a14:hiddenLine xmlns:p14="http://schemas.microsoft.com/office/powerpoint/2010/main" xmlns:a14="http://schemas.microsoft.com/office/drawing/2010/main" xmlns:a16="http://schemas.microsoft.com/office/drawing/2014/main" xmlns="" w="9525">
                   <a:solidFill>
                     <a:srgbClr val="000000"/>
                   </a:solidFill>
@@ -27340,7 +27332,7 @@
             </a:ln>
             <a:extLst>
               <a:ext uri="{91240B29-F687-4f45-9708-019B960494DF}">
-                <a14:hiddenLine xmlns="" xmlns:a16="http://schemas.microsoft.com/office/drawing/2014/main" xmlns:a14="http://schemas.microsoft.com/office/drawing/2010/main" xmlns:p14="http://schemas.microsoft.com/office/powerpoint/2010/main" w="9525">
+                <a14:hiddenLine xmlns:p14="http://schemas.microsoft.com/office/powerpoint/2010/main" xmlns:a14="http://schemas.microsoft.com/office/drawing/2010/main" xmlns:a16="http://schemas.microsoft.com/office/drawing/2014/main" xmlns="" w="9525">
                   <a:solidFill>
                     <a:srgbClr val="000000"/>
                   </a:solidFill>
@@ -27445,7 +27437,7 @@
             </a:ln>
             <a:extLst>
               <a:ext uri="{91240B29-F687-4f45-9708-019B960494DF}">
-                <a14:hiddenLine xmlns="" xmlns:a16="http://schemas.microsoft.com/office/drawing/2014/main" xmlns:a14="http://schemas.microsoft.com/office/drawing/2010/main" xmlns:p14="http://schemas.microsoft.com/office/powerpoint/2010/main" w="9525">
+                <a14:hiddenLine xmlns:p14="http://schemas.microsoft.com/office/powerpoint/2010/main" xmlns:a14="http://schemas.microsoft.com/office/drawing/2010/main" xmlns:a16="http://schemas.microsoft.com/office/drawing/2014/main" xmlns="" w="9525">
                   <a:solidFill>
                     <a:srgbClr val="000000"/>
                   </a:solidFill>
@@ -27494,7 +27486,7 @@
             </a:ln>
             <a:extLst>
               <a:ext uri="{91240B29-F687-4f45-9708-019B960494DF}">
-                <a14:hiddenLine xmlns="" xmlns:a16="http://schemas.microsoft.com/office/drawing/2014/main" xmlns:a14="http://schemas.microsoft.com/office/drawing/2010/main" xmlns:p14="http://schemas.microsoft.com/office/powerpoint/2010/main" w="9525">
+                <a14:hiddenLine xmlns:p14="http://schemas.microsoft.com/office/powerpoint/2010/main" xmlns:a14="http://schemas.microsoft.com/office/drawing/2010/main" xmlns:a16="http://schemas.microsoft.com/office/drawing/2014/main" xmlns="" w="9525">
                   <a:solidFill>
                     <a:srgbClr val="000000"/>
                   </a:solidFill>
@@ -27574,7 +27566,7 @@
             </a:ln>
             <a:extLst>
               <a:ext uri="{91240B29-F687-4f45-9708-019B960494DF}">
-                <a14:hiddenLine xmlns="" xmlns:a16="http://schemas.microsoft.com/office/drawing/2014/main" xmlns:a14="http://schemas.microsoft.com/office/drawing/2010/main" xmlns:p14="http://schemas.microsoft.com/office/powerpoint/2010/main" w="9525">
+                <a14:hiddenLine xmlns:p14="http://schemas.microsoft.com/office/powerpoint/2010/main" xmlns:a14="http://schemas.microsoft.com/office/drawing/2010/main" xmlns:a16="http://schemas.microsoft.com/office/drawing/2014/main" xmlns="" w="9525">
                   <a:solidFill>
                     <a:srgbClr val="000000"/>
                   </a:solidFill>
@@ -27679,7 +27671,7 @@
             </a:ln>
             <a:extLst>
               <a:ext uri="{91240B29-F687-4f45-9708-019B960494DF}">
-                <a14:hiddenLine xmlns="" xmlns:a16="http://schemas.microsoft.com/office/drawing/2014/main" xmlns:a14="http://schemas.microsoft.com/office/drawing/2010/main" xmlns:p14="http://schemas.microsoft.com/office/powerpoint/2010/main" w="9525">
+                <a14:hiddenLine xmlns:p14="http://schemas.microsoft.com/office/powerpoint/2010/main" xmlns:a14="http://schemas.microsoft.com/office/drawing/2010/main" xmlns:a16="http://schemas.microsoft.com/office/drawing/2014/main" xmlns="" w="9525">
                   <a:solidFill>
                     <a:srgbClr val="000000"/>
                   </a:solidFill>
@@ -27756,7 +27748,7 @@
             </a:ln>
             <a:extLst>
               <a:ext uri="{91240B29-F687-4f45-9708-019B960494DF}">
-                <a14:hiddenLine xmlns="" xmlns:a16="http://schemas.microsoft.com/office/drawing/2014/main" xmlns:a14="http://schemas.microsoft.com/office/drawing/2010/main" xmlns:p14="http://schemas.microsoft.com/office/powerpoint/2010/main" w="9525">
+                <a14:hiddenLine xmlns:p14="http://schemas.microsoft.com/office/powerpoint/2010/main" xmlns:a14="http://schemas.microsoft.com/office/drawing/2010/main" xmlns:a16="http://schemas.microsoft.com/office/drawing/2014/main" xmlns="" w="9525">
                   <a:solidFill>
                     <a:srgbClr val="000000"/>
                   </a:solidFill>
@@ -27861,7 +27853,7 @@
             </a:ln>
             <a:extLst>
               <a:ext uri="{91240B29-F687-4f45-9708-019B960494DF}">
-                <a14:hiddenLine xmlns="" xmlns:a16="http://schemas.microsoft.com/office/drawing/2014/main" xmlns:a14="http://schemas.microsoft.com/office/drawing/2010/main" xmlns:p14="http://schemas.microsoft.com/office/powerpoint/2010/main" w="9525">
+                <a14:hiddenLine xmlns:p14="http://schemas.microsoft.com/office/powerpoint/2010/main" xmlns:a14="http://schemas.microsoft.com/office/drawing/2010/main" xmlns:a16="http://schemas.microsoft.com/office/drawing/2014/main" xmlns="" w="9525">
                   <a:solidFill>
                     <a:srgbClr val="000000"/>
                   </a:solidFill>
@@ -27966,7 +27958,7 @@
             </a:ln>
             <a:extLst>
               <a:ext uri="{91240B29-F687-4f45-9708-019B960494DF}">
-                <a14:hiddenLine xmlns="" xmlns:a16="http://schemas.microsoft.com/office/drawing/2014/main" xmlns:a14="http://schemas.microsoft.com/office/drawing/2010/main" xmlns:p14="http://schemas.microsoft.com/office/powerpoint/2010/main" w="9525">
+                <a14:hiddenLine xmlns:p14="http://schemas.microsoft.com/office/powerpoint/2010/main" xmlns:a14="http://schemas.microsoft.com/office/drawing/2010/main" xmlns:a16="http://schemas.microsoft.com/office/drawing/2014/main" xmlns="" w="9525">
                   <a:solidFill>
                     <a:srgbClr val="000000"/>
                   </a:solidFill>
@@ -28046,7 +28038,7 @@
             </a:ln>
             <a:extLst>
               <a:ext uri="{91240B29-F687-4f45-9708-019B960494DF}">
-                <a14:hiddenLine xmlns="" xmlns:a16="http://schemas.microsoft.com/office/drawing/2014/main" xmlns:a14="http://schemas.microsoft.com/office/drawing/2010/main" xmlns:p14="http://schemas.microsoft.com/office/powerpoint/2010/main" w="9525">
+                <a14:hiddenLine xmlns:p14="http://schemas.microsoft.com/office/powerpoint/2010/main" xmlns:a14="http://schemas.microsoft.com/office/drawing/2010/main" xmlns:a16="http://schemas.microsoft.com/office/drawing/2014/main" xmlns="" w="9525">
                   <a:solidFill>
                     <a:srgbClr val="000000"/>
                   </a:solidFill>
@@ -28123,7 +28115,7 @@
             </a:ln>
             <a:extLst>
               <a:ext uri="{91240B29-F687-4f45-9708-019B960494DF}">
-                <a14:hiddenLine xmlns="" xmlns:a16="http://schemas.microsoft.com/office/drawing/2014/main" xmlns:a14="http://schemas.microsoft.com/office/drawing/2010/main" xmlns:p14="http://schemas.microsoft.com/office/powerpoint/2010/main" w="9525">
+                <a14:hiddenLine xmlns:p14="http://schemas.microsoft.com/office/powerpoint/2010/main" xmlns:a14="http://schemas.microsoft.com/office/drawing/2010/main" xmlns:a16="http://schemas.microsoft.com/office/drawing/2014/main" xmlns="" w="9525">
                   <a:solidFill>
                     <a:srgbClr val="000000"/>
                   </a:solidFill>
@@ -28228,7 +28220,7 @@
             </a:ln>
             <a:extLst>
               <a:ext uri="{91240B29-F687-4f45-9708-019B960494DF}">
-                <a14:hiddenLine xmlns="" xmlns:a16="http://schemas.microsoft.com/office/drawing/2014/main" xmlns:a14="http://schemas.microsoft.com/office/drawing/2010/main" xmlns:p14="http://schemas.microsoft.com/office/powerpoint/2010/main" w="9525">
+                <a14:hiddenLine xmlns:p14="http://schemas.microsoft.com/office/powerpoint/2010/main" xmlns:a14="http://schemas.microsoft.com/office/drawing/2010/main" xmlns:a16="http://schemas.microsoft.com/office/drawing/2014/main" xmlns="" w="9525">
                   <a:solidFill>
                     <a:srgbClr val="000000"/>
                   </a:solidFill>
@@ -28333,7 +28325,7 @@
             </a:ln>
             <a:extLst>
               <a:ext uri="{91240B29-F687-4f45-9708-019B960494DF}">
-                <a14:hiddenLine xmlns="" xmlns:a16="http://schemas.microsoft.com/office/drawing/2014/main" xmlns:a14="http://schemas.microsoft.com/office/drawing/2010/main" xmlns:p14="http://schemas.microsoft.com/office/powerpoint/2010/main" w="9525">
+                <a14:hiddenLine xmlns:p14="http://schemas.microsoft.com/office/powerpoint/2010/main" xmlns:a14="http://schemas.microsoft.com/office/drawing/2010/main" xmlns:a16="http://schemas.microsoft.com/office/drawing/2014/main" xmlns="" w="9525">
                   <a:solidFill>
                     <a:srgbClr val="000000"/>
                   </a:solidFill>
@@ -28410,7 +28402,7 @@
             </a:ln>
             <a:extLst>
               <a:ext uri="{91240B29-F687-4f45-9708-019B960494DF}">
-                <a14:hiddenLine xmlns="" xmlns:a16="http://schemas.microsoft.com/office/drawing/2014/main" xmlns:a14="http://schemas.microsoft.com/office/drawing/2010/main" xmlns:p14="http://schemas.microsoft.com/office/powerpoint/2010/main" w="9525">
+                <a14:hiddenLine xmlns:p14="http://schemas.microsoft.com/office/powerpoint/2010/main" xmlns:a14="http://schemas.microsoft.com/office/drawing/2010/main" xmlns:a16="http://schemas.microsoft.com/office/drawing/2014/main" xmlns="" w="9525">
                   <a:solidFill>
                     <a:srgbClr val="000000"/>
                   </a:solidFill>
@@ -28545,7 +28537,7 @@
             </a:ln>
             <a:extLst>
               <a:ext uri="{91240B29-F687-4f45-9708-019B960494DF}">
-                <a14:hiddenLine xmlns="" xmlns:a16="http://schemas.microsoft.com/office/drawing/2014/main" xmlns:a14="http://schemas.microsoft.com/office/drawing/2010/main" xmlns:p14="http://schemas.microsoft.com/office/powerpoint/2010/main" w="9525">
+                <a14:hiddenLine xmlns:p14="http://schemas.microsoft.com/office/powerpoint/2010/main" xmlns:a14="http://schemas.microsoft.com/office/drawing/2010/main" xmlns:a16="http://schemas.microsoft.com/office/drawing/2014/main" xmlns="" w="9525">
                   <a:solidFill>
                     <a:srgbClr val="000000"/>
                   </a:solidFill>
@@ -28628,7 +28620,7 @@
             </a:ln>
             <a:extLst>
               <a:ext uri="{91240B29-F687-4f45-9708-019B960494DF}">
-                <a14:hiddenLine xmlns="" xmlns:a16="http://schemas.microsoft.com/office/drawing/2014/main" xmlns:a14="http://schemas.microsoft.com/office/drawing/2010/main" xmlns:p14="http://schemas.microsoft.com/office/powerpoint/2010/main" w="9525">
+                <a14:hiddenLine xmlns:p14="http://schemas.microsoft.com/office/powerpoint/2010/main" xmlns:a14="http://schemas.microsoft.com/office/drawing/2010/main" xmlns:a16="http://schemas.microsoft.com/office/drawing/2014/main" xmlns="" w="9525">
                   <a:solidFill>
                     <a:srgbClr val="000000"/>
                   </a:solidFill>
@@ -28733,7 +28725,7 @@
             </a:ln>
             <a:extLst>
               <a:ext uri="{91240B29-F687-4f45-9708-019B960494DF}">
-                <a14:hiddenLine xmlns="" xmlns:a16="http://schemas.microsoft.com/office/drawing/2014/main" xmlns:a14="http://schemas.microsoft.com/office/drawing/2010/main" xmlns:p14="http://schemas.microsoft.com/office/powerpoint/2010/main" w="9525">
+                <a14:hiddenLine xmlns:p14="http://schemas.microsoft.com/office/powerpoint/2010/main" xmlns:a14="http://schemas.microsoft.com/office/drawing/2010/main" xmlns:a16="http://schemas.microsoft.com/office/drawing/2014/main" xmlns="" w="9525">
                   <a:solidFill>
                     <a:srgbClr val="000000"/>
                   </a:solidFill>
@@ -28890,7 +28882,7 @@
             <a:noFill/>
             <a:extLst>
               <a:ext uri="{909E8E84-426E-40dd-AFC4-6F175D3DCCD1}">
-                <a14:hiddenFill xmlns="" xmlns:a16="http://schemas.microsoft.com/office/drawing/2014/main" xmlns:a14="http://schemas.microsoft.com/office/drawing/2010/main" xmlns:p14="http://schemas.microsoft.com/office/powerpoint/2010/main">
+                <a14:hiddenFill xmlns:p14="http://schemas.microsoft.com/office/powerpoint/2010/main" xmlns:a14="http://schemas.microsoft.com/office/drawing/2010/main" xmlns:a16="http://schemas.microsoft.com/office/drawing/2014/main" xmlns="">
                   <a:solidFill>
                     <a:srgbClr val="FFFFFF"/>
                   </a:solidFill>

</xml_diff>